<commit_message>
Updated strawman for labs
</commit_message>
<xml_diff>
--- a/Presentation/Module00-Hols.pptx
+++ b/Presentation/Module00-Hols.pptx
@@ -6,16 +6,21 @@
     <p:sldMasterId id="2147484229" r:id="rId5"/>
   </p:sldMasterIdLst>
   <p:notesMasterIdLst>
-    <p:notesMasterId r:id="rId10"/>
+    <p:notesMasterId r:id="rId15"/>
   </p:notesMasterIdLst>
   <p:handoutMasterIdLst>
-    <p:handoutMasterId r:id="rId11"/>
+    <p:handoutMasterId r:id="rId16"/>
   </p:handoutMasterIdLst>
   <p:sldIdLst>
     <p:sldId id="1309" r:id="rId6"/>
     <p:sldId id="1342" r:id="rId7"/>
     <p:sldId id="1347" r:id="rId8"/>
-    <p:sldId id="1353" r:id="rId9"/>
+    <p:sldId id="1354" r:id="rId9"/>
+    <p:sldId id="1355" r:id="rId10"/>
+    <p:sldId id="1356" r:id="rId11"/>
+    <p:sldId id="1357" r:id="rId12"/>
+    <p:sldId id="1358" r:id="rId13"/>
+    <p:sldId id="1353" r:id="rId14"/>
   </p:sldIdLst>
   <p:sldSz cx="12436475" cy="6994525"/>
   <p:notesSz cx="6858000" cy="9144000"/>
@@ -129,6 +134,11 @@
         <p14:section name="Untitled Section" id="{2F881FF2-773A-4FA9-8076-D4A28DB643D9}">
           <p14:sldIdLst>
             <p14:sldId id="1347"/>
+            <p14:sldId id="1354"/>
+            <p14:sldId id="1355"/>
+            <p14:sldId id="1356"/>
+            <p14:sldId id="1357"/>
+            <p14:sldId id="1358"/>
             <p14:sldId id="1353"/>
           </p14:sldIdLst>
         </p14:section>
@@ -265,7 +275,7 @@
               <a:rPr lang="en-US" smtClean="0">
                 <a:latin typeface="Segoe UI" pitchFamily="34" charset="0"/>
               </a:rPr>
-              <a:t>10/5/2016 5:59 PM</a:t>
+              <a:t>10/6/2016 8:00 PM</a:t>
             </a:fld>
             <a:endParaRPr lang="en-US" dirty="0">
               <a:latin typeface="Segoe UI" pitchFamily="34" charset="0"/>
@@ -543,7 +553,7 @@
           <a:p>
             <a:fld id="{196BB360-4395-422C-A729-CB974B278917}" type="datetime8">
               <a:rPr lang="en-US" smtClean="0"/>
-              <a:t>10/5/2016 5:59 PM</a:t>
+              <a:t>10/6/2016 8:00 PM</a:t>
             </a:fld>
             <a:endParaRPr lang="en-US" dirty="0"/>
           </a:p>
@@ -872,7 +882,7 @@
           <a:p>
             <a:fld id="{B9E68977-C62F-48C1-B8E5-A952982F1FDC}" type="datetime8">
               <a:rPr lang="en-US" smtClean="0"/>
-              <a:t>10/5/2016 5:59 PM</a:t>
+              <a:t>10/6/2016 8:00 PM</a:t>
             </a:fld>
             <a:endParaRPr lang="en-US" dirty="0"/>
           </a:p>
@@ -13891,6 +13901,53 @@
       </p:grpSpPr>
       <p:sp>
         <p:nvSpPr>
+          <p:cNvPr id="2" name="Text Placeholder 1"/>
+          <p:cNvSpPr>
+            <a:spLocks noGrp="1"/>
+          </p:cNvSpPr>
+          <p:nvPr>
+            <p:ph type="body" sz="quarter" idx="10"/>
+          </p:nvPr>
+        </p:nvSpPr>
+        <p:spPr/>
+        <p:txBody>
+          <a:bodyPr/>
+          <a:lstStyle/>
+          <a:p>
+            <a:r>
+              <a:rPr lang="en-US"/>
+              <a:t>Connect Azure subscription (Pass or Trial)</a:t>
+            </a:r>
+          </a:p>
+          <a:p>
+            <a:r>
+              <a:rPr lang="en-US"/>
+              <a:t>Create O365 Developer Tenant</a:t>
+            </a:r>
+          </a:p>
+          <a:p>
+            <a:r>
+              <a:rPr lang="en-US"/>
+              <a:t>Create Visual Studio online account</a:t>
+            </a:r>
+          </a:p>
+          <a:p>
+            <a:r>
+              <a:rPr lang="en-US"/>
+              <a:t>Take prepared image, walk through the tools that are available</a:t>
+            </a:r>
+          </a:p>
+          <a:p>
+            <a:r>
+              <a:rPr lang="en-US"/>
+              <a:t>Run ARM Template to scaffold out resources</a:t>
+            </a:r>
+            <a:endParaRPr lang="en-US" dirty="0"/>
+          </a:p>
+        </p:txBody>
+      </p:sp>
+      <p:sp>
+        <p:nvSpPr>
           <p:cNvPr id="3" name="Title 2"/>
           <p:cNvSpPr>
             <a:spLocks noGrp="1"/>
@@ -13901,237 +13958,14 @@
         </p:nvSpPr>
         <p:spPr/>
         <p:txBody>
-          <a:bodyPr>
-            <a:noAutofit/>
-          </a:bodyPr>
-          <a:lstStyle/>
-          <a:p>
-            <a:pPr marL="347472" indent="-347472">
-              <a:spcBef>
-                <a:spcPts val="0"/>
-              </a:spcBef>
-              <a:spcAft>
-                <a:spcPts val="0"/>
-              </a:spcAft>
-              <a:buClrTx/>
-              <a:buSzTx/>
-              <a:buFont typeface="Arial" panose="020B0604020202020204" pitchFamily="34" charset="0"/>
-              <a:buChar char="•"/>
-            </a:pPr>
-            <a:r>
-              <a:rPr lang="en-US" dirty="0"/>
-              <a:t>HOL 1</a:t>
-            </a:r>
-          </a:p>
-          <a:p>
-            <a:pPr marL="740664" indent="-283464">
-              <a:spcBef>
-                <a:spcPts val="0"/>
-              </a:spcBef>
-              <a:spcAft>
-                <a:spcPts val="0"/>
-              </a:spcAft>
-              <a:buClrTx/>
-              <a:buSzTx/>
-              <a:buFont typeface="Arial" panose="020B0604020202020204" pitchFamily="34" charset="0"/>
-              <a:buChar char="•"/>
-            </a:pPr>
-            <a:r>
-              <a:rPr lang="en-US" dirty="0"/>
-              <a:t>Setting up your developer </a:t>
-            </a:r>
-            <a:r>
-              <a:rPr lang="en-US" dirty="0" err="1"/>
-              <a:t>environmentHOL</a:t>
-            </a:r>
-            <a:r>
-              <a:rPr lang="en-US" dirty="0"/>
-              <a:t> 2</a:t>
-            </a:r>
-          </a:p>
-          <a:p>
-            <a:pPr marL="740664" indent="-283464">
-              <a:spcBef>
-                <a:spcPts val="0"/>
-              </a:spcBef>
-              <a:spcAft>
-                <a:spcPts val="0"/>
-              </a:spcAft>
-              <a:buClrTx/>
-              <a:buSzTx/>
-              <a:buFont typeface="Arial" panose="020B0604020202020204" pitchFamily="34" charset="0"/>
-              <a:buChar char="•"/>
-            </a:pPr>
-            <a:r>
-              <a:rPr lang="en-US" dirty="0"/>
-              <a:t>Building modern cloud </a:t>
-            </a:r>
-            <a:r>
-              <a:rPr lang="en-US" dirty="0" err="1"/>
-              <a:t>appsHOL</a:t>
-            </a:r>
-            <a:r>
-              <a:rPr lang="en-US" dirty="0"/>
-              <a:t> 3</a:t>
-            </a:r>
-          </a:p>
-          <a:p>
-            <a:pPr marL="740664" indent="-283464">
-              <a:spcBef>
-                <a:spcPts val="0"/>
-              </a:spcBef>
-              <a:spcAft>
-                <a:spcPts val="0"/>
-              </a:spcAft>
-              <a:buClrTx/>
-              <a:buSzTx/>
-              <a:buFont typeface="Arial" panose="020B0604020202020204" pitchFamily="34" charset="0"/>
-              <a:buChar char="•"/>
-            </a:pPr>
-            <a:r>
-              <a:rPr lang="en-US" dirty="0"/>
-              <a:t>Identity with Azure AD and Office 365 APIs</a:t>
-            </a:r>
-          </a:p>
-          <a:p>
-            <a:pPr marL="347472" indent="-347472">
-              <a:spcBef>
-                <a:spcPts val="0"/>
-              </a:spcBef>
-              <a:spcAft>
-                <a:spcPts val="0"/>
-              </a:spcAft>
-              <a:buClrTx/>
-              <a:buSzTx/>
-              <a:buFont typeface="Arial" panose="020B0604020202020204" pitchFamily="34" charset="0"/>
-              <a:buChar char="•"/>
-            </a:pPr>
-            <a:r>
-              <a:rPr lang="en-US" dirty="0"/>
-              <a:t>HOL 4</a:t>
-            </a:r>
-          </a:p>
-          <a:p>
-            <a:pPr marL="740664" indent="-283464">
-              <a:spcBef>
-                <a:spcPts val="0"/>
-              </a:spcBef>
-              <a:spcAft>
-                <a:spcPts val="0"/>
-              </a:spcAft>
-              <a:buClrTx/>
-              <a:buSzTx/>
-              <a:buFont typeface="Arial" panose="020B0604020202020204" pitchFamily="34" charset="0"/>
-              <a:buChar char="•"/>
-            </a:pPr>
-            <a:r>
-              <a:rPr lang="en-US" dirty="0"/>
-              <a:t>DevOps with Azure and Visual Studio Team Services</a:t>
-            </a:r>
-          </a:p>
-          <a:p>
-            <a:pPr marL="347472" indent="-347472">
-              <a:spcBef>
-                <a:spcPts val="0"/>
-              </a:spcBef>
-              <a:spcAft>
-                <a:spcPts val="0"/>
-              </a:spcAft>
-              <a:buClrTx/>
-              <a:buSzTx/>
-              <a:buFont typeface="Arial" panose="020B0604020202020204" pitchFamily="34" charset="0"/>
-              <a:buChar char="•"/>
-            </a:pPr>
-            <a:r>
-              <a:rPr lang="en-US" dirty="0"/>
-              <a:t>HOL 5</a:t>
-            </a:r>
-          </a:p>
-          <a:p>
-            <a:pPr marL="740664" indent="-283464">
-              <a:spcBef>
-                <a:spcPts val="0"/>
-              </a:spcBef>
-              <a:spcAft>
-                <a:spcPts val="0"/>
-              </a:spcAft>
-              <a:buClrTx/>
-              <a:buSzTx/>
-              <a:buFont typeface="Arial" panose="020B0604020202020204" pitchFamily="34" charset="0"/>
-              <a:buChar char="•"/>
-            </a:pPr>
-            <a:r>
-              <a:rPr lang="en-US" dirty="0"/>
-              <a:t>Infrastructure as code with Azure Resource Manager (ARM)</a:t>
-            </a:r>
-          </a:p>
-          <a:p>
-            <a:pPr marL="347472" indent="-347472">
-              <a:spcBef>
-                <a:spcPts val="0"/>
-              </a:spcBef>
-              <a:spcAft>
-                <a:spcPts val="0"/>
-              </a:spcAft>
-              <a:buClrTx/>
-              <a:buSzTx/>
-              <a:buFont typeface="Arial" panose="020B0604020202020204" pitchFamily="34" charset="0"/>
-              <a:buChar char="•"/>
-            </a:pPr>
-            <a:r>
-              <a:rPr lang="en-US" dirty="0"/>
-              <a:t>HOL 6</a:t>
-            </a:r>
-          </a:p>
-          <a:p>
-            <a:pPr marL="740664" indent="-283464">
-              <a:spcBef>
-                <a:spcPts val="0"/>
-              </a:spcBef>
-              <a:spcAft>
-                <a:spcPts val="0"/>
-              </a:spcAft>
-              <a:buClrTx/>
-              <a:buSzTx/>
-              <a:buFont typeface="Arial" panose="020B0604020202020204" pitchFamily="34" charset="0"/>
-              <a:buChar char="•"/>
-            </a:pPr>
-            <a:r>
-              <a:rPr lang="en-US" dirty="0"/>
-              <a:t>Monitoring applications with App Insights</a:t>
-            </a:r>
-          </a:p>
-          <a:p>
-            <a:pPr rtl="0" eaLnBrk="1" fontAlgn="auto" latinLnBrk="0" hangingPunct="1"/>
-            <a:endParaRPr lang="en-US" sz="3600" dirty="0"/>
-          </a:p>
-          <a:p>
-            <a:pPr rtl="0" eaLnBrk="1" fontAlgn="auto" latinLnBrk="0" hangingPunct="1"/>
-            <a:endParaRPr lang="en-US" sz="3600" dirty="0"/>
-          </a:p>
-        </p:txBody>
-      </p:sp>
-      <p:sp>
-        <p:nvSpPr>
-          <p:cNvPr id="2" name="Text Placeholder 1"/>
-          <p:cNvSpPr>
-            <a:spLocks noGrp="1"/>
-          </p:cNvSpPr>
-          <p:nvPr>
-            <p:ph type="body" sz="quarter" idx="10"/>
-          </p:nvPr>
-        </p:nvSpPr>
-        <p:spPr>
-          <a:xfrm>
-            <a:off x="274638" y="1212850"/>
-            <a:ext cx="11887200" cy="1292662"/>
-          </a:xfrm>
-        </p:spPr>
-        <p:txBody>
           <a:bodyPr/>
           <a:lstStyle/>
           <a:p>
-            <a:endParaRPr lang="en-US"/>
+            <a:r>
+              <a:rPr lang="en-US"/>
+              <a:t>HOL 1: Setting up your developer environment</a:t>
+            </a:r>
+            <a:endParaRPr lang="en-US" dirty="0"/>
           </a:p>
         </p:txBody>
       </p:sp>
@@ -14152,6 +13986,593 @@
 </file>
 
 <file path=ppt/slides/slide4.xml><?xml version="1.0" encoding="utf-8"?>
+<p:sld xmlns:a="http://schemas.openxmlformats.org/drawingml/2006/main" xmlns:r="http://schemas.openxmlformats.org/officeDocument/2006/relationships" xmlns:p="http://schemas.openxmlformats.org/presentationml/2006/main">
+  <p:cSld>
+    <p:spTree>
+      <p:nvGrpSpPr>
+        <p:cNvPr id="1" name=""/>
+        <p:cNvGrpSpPr/>
+        <p:nvPr/>
+      </p:nvGrpSpPr>
+      <p:grpSpPr>
+        <a:xfrm>
+          <a:off x="0" y="0"/>
+          <a:ext cx="0" cy="0"/>
+          <a:chOff x="0" y="0"/>
+          <a:chExt cx="0" cy="0"/>
+        </a:xfrm>
+      </p:grpSpPr>
+      <p:sp>
+        <p:nvSpPr>
+          <p:cNvPr id="3" name="Text Placeholder 2"/>
+          <p:cNvSpPr>
+            <a:spLocks noGrp="1"/>
+          </p:cNvSpPr>
+          <p:nvPr>
+            <p:ph type="body" sz="quarter" idx="10"/>
+          </p:nvPr>
+        </p:nvSpPr>
+        <p:spPr/>
+        <p:txBody>
+          <a:bodyPr/>
+          <a:lstStyle/>
+          <a:p>
+            <a:r>
+              <a:rPr lang="en-US" dirty="0"/>
+              <a:t>Starting with provisioned resource group</a:t>
+            </a:r>
+          </a:p>
+          <a:p>
+            <a:r>
+              <a:rPr lang="en-US" dirty="0"/>
+              <a:t>Select front end app (Node.js /.NET/ Java)</a:t>
+            </a:r>
+          </a:p>
+          <a:p>
+            <a:r>
+              <a:rPr lang="en-US" dirty="0"/>
+              <a:t>Connect to deployed API</a:t>
+            </a:r>
+          </a:p>
+          <a:p>
+            <a:r>
+              <a:rPr lang="en-US" dirty="0"/>
+              <a:t>Add blob storage</a:t>
+            </a:r>
+          </a:p>
+          <a:p>
+            <a:r>
+              <a:rPr lang="en-US" dirty="0"/>
+              <a:t>Add queueing</a:t>
+            </a:r>
+          </a:p>
+          <a:p>
+            <a:r>
+              <a:rPr lang="en-US" dirty="0"/>
+              <a:t>Add </a:t>
+            </a:r>
+            <a:r>
+              <a:rPr lang="en-US" dirty="0" err="1"/>
+              <a:t>Redis</a:t>
+            </a:r>
+            <a:r>
+              <a:rPr lang="en-US" dirty="0"/>
+              <a:t> cache</a:t>
+            </a:r>
+          </a:p>
+          <a:p>
+            <a:r>
+              <a:rPr lang="en-US" dirty="0"/>
+              <a:t>Stretch: Image resizing with Function</a:t>
+            </a:r>
+          </a:p>
+        </p:txBody>
+      </p:sp>
+      <p:sp>
+        <p:nvSpPr>
+          <p:cNvPr id="2" name="Title 1"/>
+          <p:cNvSpPr>
+            <a:spLocks noGrp="1"/>
+          </p:cNvSpPr>
+          <p:nvPr>
+            <p:ph type="title"/>
+          </p:nvPr>
+        </p:nvSpPr>
+        <p:spPr/>
+        <p:txBody>
+          <a:bodyPr/>
+          <a:lstStyle/>
+          <a:p>
+            <a:r>
+              <a:rPr lang="en-US"/>
+              <a:t>HOL 2: Building modern cloud apps</a:t>
+            </a:r>
+            <a:endParaRPr lang="en-US" dirty="0"/>
+          </a:p>
+        </p:txBody>
+      </p:sp>
+    </p:spTree>
+    <p:extLst>
+      <p:ext uri="{BB962C8B-B14F-4D97-AF65-F5344CB8AC3E}">
+        <p14:creationId xmlns:p14="http://schemas.microsoft.com/office/powerpoint/2010/main" val="103508438"/>
+      </p:ext>
+    </p:extLst>
+  </p:cSld>
+  <p:clrMapOvr>
+    <a:masterClrMapping/>
+  </p:clrMapOvr>
+  <p:transition>
+    <p:fade/>
+  </p:transition>
+</p:sld>
+</file>
+
+<file path=ppt/slides/slide5.xml><?xml version="1.0" encoding="utf-8"?>
+<p:sld xmlns:a="http://schemas.openxmlformats.org/drawingml/2006/main" xmlns:r="http://schemas.openxmlformats.org/officeDocument/2006/relationships" xmlns:p="http://schemas.openxmlformats.org/presentationml/2006/main">
+  <p:cSld>
+    <p:spTree>
+      <p:nvGrpSpPr>
+        <p:cNvPr id="1" name=""/>
+        <p:cNvGrpSpPr/>
+        <p:nvPr/>
+      </p:nvGrpSpPr>
+      <p:grpSpPr>
+        <a:xfrm>
+          <a:off x="0" y="0"/>
+          <a:ext cx="0" cy="0"/>
+          <a:chOff x="0" y="0"/>
+          <a:chExt cx="0" cy="0"/>
+        </a:xfrm>
+      </p:grpSpPr>
+      <p:sp>
+        <p:nvSpPr>
+          <p:cNvPr id="3" name="Text Placeholder 2"/>
+          <p:cNvSpPr>
+            <a:spLocks noGrp="1"/>
+          </p:cNvSpPr>
+          <p:nvPr>
+            <p:ph type="body" sz="quarter" idx="10"/>
+          </p:nvPr>
+        </p:nvSpPr>
+        <p:spPr/>
+        <p:txBody>
+          <a:bodyPr>
+            <a:normAutofit fontScale="40000" lnSpcReduction="20000"/>
+          </a:bodyPr>
+          <a:lstStyle/>
+          <a:p>
+            <a:r>
+              <a:rPr lang="en-US" dirty="0"/>
+              <a:t>Find AD </a:t>
+            </a:r>
+          </a:p>
+          <a:p>
+            <a:r>
+              <a:rPr lang="en-US" dirty="0"/>
+              <a:t>Create AD Application</a:t>
+            </a:r>
+          </a:p>
+          <a:p>
+            <a:r>
+              <a:rPr lang="en-US" dirty="0"/>
+              <a:t>Add authentication to app</a:t>
+            </a:r>
+          </a:p>
+          <a:p>
+            <a:r>
+              <a:rPr lang="en-US" dirty="0"/>
+              <a:t>Authenticate</a:t>
+            </a:r>
+          </a:p>
+          <a:p>
+            <a:r>
+              <a:rPr lang="en-US" dirty="0"/>
+              <a:t>Add profile page</a:t>
+            </a:r>
+          </a:p>
+          <a:p>
+            <a:r>
+              <a:rPr lang="en-US" dirty="0"/>
+              <a:t>Add graph API call to get user data for profile page</a:t>
+            </a:r>
+          </a:p>
+          <a:p>
+            <a:r>
+              <a:rPr lang="en-US" dirty="0"/>
+              <a:t>Populate first &amp; last name of the new incident form with first name &amp; last name from Graph/token</a:t>
+            </a:r>
+          </a:p>
+          <a:p>
+            <a:r>
+              <a:rPr lang="en-US" dirty="0"/>
+              <a:t>Send Email via Graph on new incident creation</a:t>
+            </a:r>
+          </a:p>
+          <a:p>
+            <a:r>
+              <a:rPr lang="en-US" dirty="0"/>
+              <a:t>Stretch: Add calendar event on new incident creation</a:t>
+            </a:r>
+          </a:p>
+        </p:txBody>
+      </p:sp>
+      <p:sp>
+        <p:nvSpPr>
+          <p:cNvPr id="2" name="Title 1"/>
+          <p:cNvSpPr>
+            <a:spLocks noGrp="1"/>
+          </p:cNvSpPr>
+          <p:nvPr>
+            <p:ph type="title"/>
+          </p:nvPr>
+        </p:nvSpPr>
+        <p:spPr/>
+        <p:txBody>
+          <a:bodyPr>
+            <a:normAutofit fontScale="90000"/>
+          </a:bodyPr>
+          <a:lstStyle/>
+          <a:p>
+            <a:r>
+              <a:rPr lang="en-US" dirty="0"/>
+              <a:t>HOL 3: Identity with Azure AD and Office 365 APIs</a:t>
+            </a:r>
+          </a:p>
+        </p:txBody>
+      </p:sp>
+    </p:spTree>
+    <p:extLst>
+      <p:ext uri="{BB962C8B-B14F-4D97-AF65-F5344CB8AC3E}">
+        <p14:creationId xmlns:p14="http://schemas.microsoft.com/office/powerpoint/2010/main" val="2890623480"/>
+      </p:ext>
+    </p:extLst>
+  </p:cSld>
+  <p:clrMapOvr>
+    <a:masterClrMapping/>
+  </p:clrMapOvr>
+  <p:transition>
+    <p:fade/>
+  </p:transition>
+</p:sld>
+</file>
+
+<file path=ppt/slides/slide6.xml><?xml version="1.0" encoding="utf-8"?>
+<p:sld xmlns:a="http://schemas.openxmlformats.org/drawingml/2006/main" xmlns:r="http://schemas.openxmlformats.org/officeDocument/2006/relationships" xmlns:p="http://schemas.openxmlformats.org/presentationml/2006/main">
+  <p:cSld>
+    <p:spTree>
+      <p:nvGrpSpPr>
+        <p:cNvPr id="1" name=""/>
+        <p:cNvGrpSpPr/>
+        <p:nvPr/>
+      </p:nvGrpSpPr>
+      <p:grpSpPr>
+        <a:xfrm>
+          <a:off x="0" y="0"/>
+          <a:ext cx="0" cy="0"/>
+          <a:chOff x="0" y="0"/>
+          <a:chExt cx="0" cy="0"/>
+        </a:xfrm>
+      </p:grpSpPr>
+      <p:sp>
+        <p:nvSpPr>
+          <p:cNvPr id="3" name="Text Placeholder 2"/>
+          <p:cNvSpPr>
+            <a:spLocks noGrp="1"/>
+          </p:cNvSpPr>
+          <p:nvPr>
+            <p:ph type="body" sz="quarter" idx="10"/>
+          </p:nvPr>
+        </p:nvSpPr>
+        <p:spPr/>
+        <p:txBody>
+          <a:bodyPr/>
+          <a:lstStyle/>
+          <a:p>
+            <a:r>
+              <a:rPr lang="en-US"/>
+              <a:t>Create VSTS Tenant</a:t>
+            </a:r>
+          </a:p>
+          <a:p>
+            <a:r>
+              <a:rPr lang="en-US"/>
+              <a:t>Create Git repository</a:t>
+            </a:r>
+          </a:p>
+          <a:p>
+            <a:r>
+              <a:rPr lang="en-US"/>
+              <a:t>Clone git repo locally</a:t>
+            </a:r>
+          </a:p>
+          <a:p>
+            <a:r>
+              <a:rPr lang="en-US"/>
+              <a:t>Push code into VSTS</a:t>
+            </a:r>
+          </a:p>
+          <a:p>
+            <a:r>
+              <a:rPr lang="en-US"/>
+              <a:t>Create CI pipeline to build</a:t>
+            </a:r>
+          </a:p>
+          <a:p>
+            <a:r>
+              <a:rPr lang="en-US"/>
+              <a:t>Ends with published artifacts</a:t>
+            </a:r>
+            <a:endParaRPr lang="en-US" dirty="0"/>
+          </a:p>
+        </p:txBody>
+      </p:sp>
+      <p:sp>
+        <p:nvSpPr>
+          <p:cNvPr id="2" name="Title 1"/>
+          <p:cNvSpPr>
+            <a:spLocks noGrp="1"/>
+          </p:cNvSpPr>
+          <p:nvPr>
+            <p:ph type="title"/>
+          </p:nvPr>
+        </p:nvSpPr>
+        <p:spPr/>
+        <p:txBody>
+          <a:bodyPr/>
+          <a:lstStyle/>
+          <a:p>
+            <a:r>
+              <a:rPr lang="en-US"/>
+              <a:t>HOL 4: DevOps with Azure and VSTS</a:t>
+            </a:r>
+            <a:endParaRPr lang="en-US" dirty="0"/>
+          </a:p>
+        </p:txBody>
+      </p:sp>
+    </p:spTree>
+    <p:extLst>
+      <p:ext uri="{BB962C8B-B14F-4D97-AF65-F5344CB8AC3E}">
+        <p14:creationId xmlns:p14="http://schemas.microsoft.com/office/powerpoint/2010/main" val="3481618648"/>
+      </p:ext>
+    </p:extLst>
+  </p:cSld>
+  <p:clrMapOvr>
+    <a:masterClrMapping/>
+  </p:clrMapOvr>
+  <p:transition>
+    <p:fade/>
+  </p:transition>
+</p:sld>
+</file>
+
+<file path=ppt/slides/slide7.xml><?xml version="1.0" encoding="utf-8"?>
+<p:sld xmlns:a="http://schemas.openxmlformats.org/drawingml/2006/main" xmlns:r="http://schemas.openxmlformats.org/officeDocument/2006/relationships" xmlns:p="http://schemas.openxmlformats.org/presentationml/2006/main">
+  <p:cSld>
+    <p:spTree>
+      <p:nvGrpSpPr>
+        <p:cNvPr id="1" name=""/>
+        <p:cNvGrpSpPr/>
+        <p:nvPr/>
+      </p:nvGrpSpPr>
+      <p:grpSpPr>
+        <a:xfrm>
+          <a:off x="0" y="0"/>
+          <a:ext cx="0" cy="0"/>
+          <a:chOff x="0" y="0"/>
+          <a:chExt cx="0" cy="0"/>
+        </a:xfrm>
+      </p:grpSpPr>
+      <p:sp>
+        <p:nvSpPr>
+          <p:cNvPr id="3" name="Text Placeholder 2"/>
+          <p:cNvSpPr>
+            <a:spLocks noGrp="1"/>
+          </p:cNvSpPr>
+          <p:nvPr>
+            <p:ph type="body" sz="quarter" idx="10"/>
+          </p:nvPr>
+        </p:nvSpPr>
+        <p:spPr/>
+        <p:txBody>
+          <a:bodyPr/>
+          <a:lstStyle/>
+          <a:p>
+            <a:r>
+              <a:rPr lang="en-US"/>
+              <a:t>Create ARM template for web app in VS</a:t>
+            </a:r>
+          </a:p>
+          <a:p>
+            <a:r>
+              <a:rPr lang="en-US"/>
+              <a:t>Deploy using VSTS</a:t>
+            </a:r>
+          </a:p>
+          <a:p>
+            <a:r>
+              <a:rPr lang="en-US"/>
+              <a:t>Create 3 environments</a:t>
+            </a:r>
+          </a:p>
+          <a:p>
+            <a:r>
+              <a:rPr lang="en-US"/>
+              <a:t>Configure CD</a:t>
+            </a:r>
+          </a:p>
+          <a:p>
+            <a:endParaRPr lang="en-US" dirty="0"/>
+          </a:p>
+        </p:txBody>
+      </p:sp>
+      <p:sp>
+        <p:nvSpPr>
+          <p:cNvPr id="2" name="Title 1"/>
+          <p:cNvSpPr>
+            <a:spLocks noGrp="1"/>
+          </p:cNvSpPr>
+          <p:nvPr>
+            <p:ph type="title"/>
+          </p:nvPr>
+        </p:nvSpPr>
+        <p:spPr/>
+        <p:txBody>
+          <a:bodyPr/>
+          <a:lstStyle/>
+          <a:p>
+            <a:r>
+              <a:rPr lang="en-US"/>
+              <a:t>HOL 5: Infrastructure as code with (ARM)</a:t>
+            </a:r>
+            <a:endParaRPr lang="en-US" dirty="0"/>
+          </a:p>
+        </p:txBody>
+      </p:sp>
+    </p:spTree>
+    <p:extLst>
+      <p:ext uri="{BB962C8B-B14F-4D97-AF65-F5344CB8AC3E}">
+        <p14:creationId xmlns:p14="http://schemas.microsoft.com/office/powerpoint/2010/main" val="3620859700"/>
+      </p:ext>
+    </p:extLst>
+  </p:cSld>
+  <p:clrMapOvr>
+    <a:masterClrMapping/>
+  </p:clrMapOvr>
+  <p:transition>
+    <p:fade/>
+  </p:transition>
+</p:sld>
+</file>
+
+<file path=ppt/slides/slide8.xml><?xml version="1.0" encoding="utf-8"?>
+<p:sld xmlns:a="http://schemas.openxmlformats.org/drawingml/2006/main" xmlns:r="http://schemas.openxmlformats.org/officeDocument/2006/relationships" xmlns:p="http://schemas.openxmlformats.org/presentationml/2006/main">
+  <p:cSld>
+    <p:spTree>
+      <p:nvGrpSpPr>
+        <p:cNvPr id="1" name=""/>
+        <p:cNvGrpSpPr/>
+        <p:nvPr/>
+      </p:nvGrpSpPr>
+      <p:grpSpPr>
+        <a:xfrm>
+          <a:off x="0" y="0"/>
+          <a:ext cx="0" cy="0"/>
+          <a:chOff x="0" y="0"/>
+          <a:chExt cx="0" cy="0"/>
+        </a:xfrm>
+      </p:grpSpPr>
+      <p:sp>
+        <p:nvSpPr>
+          <p:cNvPr id="3" name="Text Placeholder 2"/>
+          <p:cNvSpPr>
+            <a:spLocks noGrp="1"/>
+          </p:cNvSpPr>
+          <p:nvPr>
+            <p:ph type="body" sz="quarter" idx="10"/>
+          </p:nvPr>
+        </p:nvSpPr>
+        <p:spPr/>
+        <p:txBody>
+          <a:bodyPr/>
+          <a:lstStyle/>
+          <a:p>
+            <a:r>
+              <a:rPr lang="en-US"/>
+              <a:t>Add App Insights resource to Azure</a:t>
+            </a:r>
+          </a:p>
+          <a:p>
+            <a:r>
+              <a:rPr lang="en-US"/>
+              <a:t>Add App Insights to application</a:t>
+            </a:r>
+          </a:p>
+          <a:p>
+            <a:r>
+              <a:rPr lang="en-US"/>
+              <a:t>Add server side SDK</a:t>
+            </a:r>
+          </a:p>
+          <a:p>
+            <a:r>
+              <a:rPr lang="en-US"/>
+              <a:t>Add client side libraries</a:t>
+            </a:r>
+          </a:p>
+          <a:p>
+            <a:r>
+              <a:rPr lang="en-US"/>
+              <a:t>Create custom events</a:t>
+            </a:r>
+          </a:p>
+          <a:p>
+            <a:r>
+              <a:rPr lang="en-US"/>
+              <a:t>Create custom metric</a:t>
+            </a:r>
+          </a:p>
+          <a:p>
+            <a:r>
+              <a:rPr lang="en-US"/>
+              <a:t>Create availability test</a:t>
+            </a:r>
+          </a:p>
+          <a:p>
+            <a:r>
+              <a:rPr lang="en-US"/>
+              <a:t>View the dashboard</a:t>
+            </a:r>
+            <a:endParaRPr lang="en-US" dirty="0"/>
+          </a:p>
+        </p:txBody>
+      </p:sp>
+      <p:sp>
+        <p:nvSpPr>
+          <p:cNvPr id="2" name="Title 1"/>
+          <p:cNvSpPr>
+            <a:spLocks noGrp="1"/>
+          </p:cNvSpPr>
+          <p:nvPr>
+            <p:ph type="title"/>
+          </p:nvPr>
+        </p:nvSpPr>
+        <p:spPr/>
+        <p:txBody>
+          <a:bodyPr>
+            <a:normAutofit fontScale="90000"/>
+          </a:bodyPr>
+          <a:lstStyle/>
+          <a:p>
+            <a:r>
+              <a:rPr lang="en-US" dirty="0"/>
+              <a:t>HOL 6: Monitoring applications with App Insights</a:t>
+            </a:r>
+          </a:p>
+          <a:p>
+            <a:endParaRPr lang="en-US" dirty="0"/>
+          </a:p>
+          <a:p>
+            <a:endParaRPr lang="en-US" dirty="0"/>
+          </a:p>
+        </p:txBody>
+      </p:sp>
+    </p:spTree>
+    <p:extLst>
+      <p:ext uri="{BB962C8B-B14F-4D97-AF65-F5344CB8AC3E}">
+        <p14:creationId xmlns:p14="http://schemas.microsoft.com/office/powerpoint/2010/main" val="2211970092"/>
+      </p:ext>
+    </p:extLst>
+  </p:cSld>
+  <p:clrMapOvr>
+    <a:masterClrMapping/>
+  </p:clrMapOvr>
+  <p:transition>
+    <p:fade/>
+  </p:transition>
+</p:sld>
+</file>
+
+<file path=ppt/slides/slide9.xml><?xml version="1.0" encoding="utf-8"?>
 <p:sld xmlns:a="http://schemas.openxmlformats.org/drawingml/2006/main" xmlns:r="http://schemas.openxmlformats.org/officeDocument/2006/relationships" xmlns:p="http://schemas.openxmlformats.org/presentationml/2006/main">
   <p:cSld>
     <p:spTree>
@@ -15355,6 +15776,15 @@
 </file>
 
 <file path=customXml/item1.xml><?xml version="1.0" encoding="utf-8"?>
+<?mso-contentType ?>
+<FormTemplates xmlns="http://schemas.microsoft.com/sharepoint/v3/contenttype/forms">
+  <Display>DocumentLibraryForm</Display>
+  <Edit>DocumentLibraryForm</Edit>
+  <New>DocumentLibraryForm</New>
+</FormTemplates>
+</file>
+
+<file path=customXml/item2.xml><?xml version="1.0" encoding="utf-8"?>
 <ct:contentTypeSchema xmlns:ct="http://schemas.microsoft.com/office/2006/metadata/contentType" xmlns:ma="http://schemas.microsoft.com/office/2006/metadata/properties/metaAttributes" ct:_="" ma:_="" ma:contentTypeName="Document" ma:contentTypeID="0x010100A2B0BB5962AB3C45A9A1CE1EC4C4F647" ma:contentTypeVersion="3" ma:contentTypeDescription="Create a new document." ma:contentTypeScope="" ma:versionID="f0876370c90de824ab54c09b0bd2a056">
   <xsd:schema xmlns:xsd="http://www.w3.org/2001/XMLSchema" xmlns:xs="http://www.w3.org/2001/XMLSchema" xmlns:p="http://schemas.microsoft.com/office/2006/metadata/properties" xmlns:ns3="630a2e83-186a-4a0f-ab27-bee8a8096abc" targetNamespace="http://schemas.microsoft.com/office/2006/metadata/properties" ma:root="true" ma:fieldsID="a2a3b5ed8b4accd7c8a398d0cb075271" ns3:_="">
     <xsd:import namespace="630a2e83-186a-4a0f-ab27-bee8a8096abc"/>
@@ -15508,15 +15938,6 @@
 </ct:contentTypeSchema>
 </file>
 
-<file path=customXml/item2.xml><?xml version="1.0" encoding="utf-8"?>
-<?mso-contentType ?>
-<FormTemplates xmlns="http://schemas.microsoft.com/sharepoint/v3/contenttype/forms">
-  <Display>DocumentLibraryForm</Display>
-  <Edit>DocumentLibraryForm</Edit>
-  <New>DocumentLibraryForm</New>
-</FormTemplates>
-</file>
-
 <file path=customXml/item3.xml><?xml version="1.0" encoding="utf-8"?>
 <p:properties xmlns:p="http://schemas.microsoft.com/office/2006/metadata/properties" xmlns:xsi="http://www.w3.org/2001/XMLSchema-instance" xmlns:pc="http://schemas.microsoft.com/office/infopath/2007/PartnerControls">
   <documentManagement/>
@@ -15524,6 +15945,14 @@
 </file>
 
 <file path=customXml/itemProps1.xml><?xml version="1.0" encoding="utf-8"?>
+<ds:datastoreItem xmlns:ds="http://schemas.openxmlformats.org/officeDocument/2006/customXml" ds:itemID="{758FDAC0-319D-4A54-8D8E-1D42CB1F8004}">
+  <ds:schemaRefs>
+    <ds:schemaRef ds:uri="http://schemas.microsoft.com/sharepoint/v3/contenttype/forms"/>
+  </ds:schemaRefs>
+</ds:datastoreItem>
+</file>
+
+<file path=customXml/itemProps2.xml><?xml version="1.0" encoding="utf-8"?>
 <ds:datastoreItem xmlns:ds="http://schemas.openxmlformats.org/officeDocument/2006/customXml" ds:itemID="{F4553072-E538-48C4-90FC-3653F32D67C5}">
   <ds:schemaRefs>
     <ds:schemaRef ds:uri="http://schemas.microsoft.com/office/2006/metadata/contentType"/>
@@ -15537,14 +15966,6 @@
     <ds:schemaRef ds:uri="http://purl.org/dc/elements/1.1/"/>
     <ds:schemaRef ds:uri="http://purl.org/dc/terms/"/>
     <ds:schemaRef ds:uri="http://schemas.microsoft.com/internal/obd"/>
-  </ds:schemaRefs>
-</ds:datastoreItem>
-</file>
-
-<file path=customXml/itemProps2.xml><?xml version="1.0" encoding="utf-8"?>
-<ds:datastoreItem xmlns:ds="http://schemas.openxmlformats.org/officeDocument/2006/customXml" ds:itemID="{758FDAC0-319D-4A54-8D8E-1D42CB1F8004}">
-  <ds:schemaRefs>
-    <ds:schemaRef ds:uri="http://schemas.microsoft.com/sharepoint/v3/contenttype/forms"/>
   </ds:schemaRefs>
 </ds:datastoreItem>
 </file>

</xml_diff>

<commit_message>
Added visual for app architecture-WIP
</commit_message>
<xml_diff>
--- a/Presentation/Module00-Hols.pptx
+++ b/Presentation/Module00-Hols.pptx
@@ -6,21 +6,24 @@
     <p:sldMasterId id="2147484229" r:id="rId5"/>
   </p:sldMasterIdLst>
   <p:notesMasterIdLst>
-    <p:notesMasterId r:id="rId15"/>
+    <p:notesMasterId r:id="rId18"/>
   </p:notesMasterIdLst>
   <p:handoutMasterIdLst>
-    <p:handoutMasterId r:id="rId16"/>
+    <p:handoutMasterId r:id="rId19"/>
   </p:handoutMasterIdLst>
   <p:sldIdLst>
     <p:sldId id="1309" r:id="rId6"/>
     <p:sldId id="1342" r:id="rId7"/>
-    <p:sldId id="1347" r:id="rId8"/>
-    <p:sldId id="1354" r:id="rId9"/>
-    <p:sldId id="1355" r:id="rId10"/>
-    <p:sldId id="1356" r:id="rId11"/>
-    <p:sldId id="1357" r:id="rId12"/>
-    <p:sldId id="1358" r:id="rId13"/>
-    <p:sldId id="1353" r:id="rId14"/>
+    <p:sldId id="1361" r:id="rId8"/>
+    <p:sldId id="1359" r:id="rId9"/>
+    <p:sldId id="1360" r:id="rId10"/>
+    <p:sldId id="1347" r:id="rId11"/>
+    <p:sldId id="1354" r:id="rId12"/>
+    <p:sldId id="1355" r:id="rId13"/>
+    <p:sldId id="1356" r:id="rId14"/>
+    <p:sldId id="1357" r:id="rId15"/>
+    <p:sldId id="1358" r:id="rId16"/>
+    <p:sldId id="1353" r:id="rId17"/>
   </p:sldIdLst>
   <p:sldSz cx="12436475" cy="6994525"/>
   <p:notesSz cx="6858000" cy="9144000"/>
@@ -129,7 +132,11 @@
           </p14:sldIdLst>
         </p14:section>
         <p14:section name="Intro - X minutes" id="{262DF92D-807A-457B-83EF-C53B8BA76377}">
-          <p14:sldIdLst/>
+          <p14:sldIdLst>
+            <p14:sldId id="1361"/>
+            <p14:sldId id="1359"/>
+            <p14:sldId id="1360"/>
+          </p14:sldIdLst>
         </p14:section>
         <p14:section name="Untitled Section" id="{2F881FF2-773A-4FA9-8076-D4A28DB643D9}">
           <p14:sldIdLst>
@@ -275,7 +282,7 @@
               <a:rPr lang="en-US" smtClean="0">
                 <a:latin typeface="Segoe UI" pitchFamily="34" charset="0"/>
               </a:rPr>
-              <a:t>10/6/2016 8:00 PM</a:t>
+              <a:t>10/6/2016 8:34 PM</a:t>
             </a:fld>
             <a:endParaRPr lang="en-US" dirty="0">
               <a:latin typeface="Segoe UI" pitchFamily="34" charset="0"/>
@@ -553,7 +560,7 @@
           <a:p>
             <a:fld id="{196BB360-4395-422C-A729-CB974B278917}" type="datetime8">
               <a:rPr lang="en-US" smtClean="0"/>
-              <a:t>10/6/2016 8:00 PM</a:t>
+              <a:t>10/6/2016 8:34 PM</a:t>
             </a:fld>
             <a:endParaRPr lang="en-US" dirty="0"/>
           </a:p>
@@ -882,7 +889,7 @@
           <a:p>
             <a:fld id="{B9E68977-C62F-48C1-B8E5-A952982F1FDC}" type="datetime8">
               <a:rPr lang="en-US" smtClean="0"/>
-              <a:t>10/6/2016 8:00 PM</a:t>
+              <a:t>10/6/2016 8:34 PM</a:t>
             </a:fld>
             <a:endParaRPr lang="en-US" dirty="0"/>
           </a:p>
@@ -970,6 +977,187 @@
     <p:extLst>
       <p:ext uri="{BB962C8B-B14F-4D97-AF65-F5344CB8AC3E}">
         <p14:creationId xmlns:p14="http://schemas.microsoft.com/office/powerpoint/2010/main" val="2865388468"/>
+      </p:ext>
+    </p:extLst>
+  </p:cSld>
+  <p:clrMapOvr>
+    <a:masterClrMapping/>
+  </p:clrMapOvr>
+</p:notes>
+</file>
+
+<file path=ppt/notesSlides/notesSlide2.xml><?xml version="1.0" encoding="utf-8"?>
+<p:notes xmlns:a="http://schemas.openxmlformats.org/drawingml/2006/main" xmlns:r="http://schemas.openxmlformats.org/officeDocument/2006/relationships" xmlns:p="http://schemas.openxmlformats.org/presentationml/2006/main">
+  <p:cSld>
+    <p:spTree>
+      <p:nvGrpSpPr>
+        <p:cNvPr id="1" name=""/>
+        <p:cNvGrpSpPr/>
+        <p:nvPr/>
+      </p:nvGrpSpPr>
+      <p:grpSpPr>
+        <a:xfrm>
+          <a:off x="0" y="0"/>
+          <a:ext cx="0" cy="0"/>
+          <a:chOff x="0" y="0"/>
+          <a:chExt cx="0" cy="0"/>
+        </a:xfrm>
+      </p:grpSpPr>
+      <p:sp>
+        <p:nvSpPr>
+          <p:cNvPr id="2" name="Slide Image Placeholder 1"/>
+          <p:cNvSpPr>
+            <a:spLocks noGrp="1" noRot="1" noChangeAspect="1"/>
+          </p:cNvSpPr>
+          <p:nvPr>
+            <p:ph type="sldImg"/>
+          </p:nvPr>
+        </p:nvSpPr>
+        <p:spPr/>
+      </p:sp>
+      <p:sp>
+        <p:nvSpPr>
+          <p:cNvPr id="3" name="Notes Placeholder 2"/>
+          <p:cNvSpPr>
+            <a:spLocks noGrp="1"/>
+          </p:cNvSpPr>
+          <p:nvPr>
+            <p:ph type="body" idx="1"/>
+          </p:nvPr>
+        </p:nvSpPr>
+        <p:spPr/>
+        <p:txBody>
+          <a:bodyPr/>
+          <a:lstStyle/>
+          <a:p>
+            <a:endParaRPr lang="en-US" dirty="0"/>
+          </a:p>
+        </p:txBody>
+      </p:sp>
+      <p:sp>
+        <p:nvSpPr>
+          <p:cNvPr id="4" name="Header Placeholder 3"/>
+          <p:cNvSpPr>
+            <a:spLocks noGrp="1"/>
+          </p:cNvSpPr>
+          <p:nvPr>
+            <p:ph type="hdr" sz="quarter" idx="10"/>
+          </p:nvPr>
+        </p:nvSpPr>
+        <p:spPr/>
+        <p:txBody>
+          <a:bodyPr/>
+          <a:lstStyle/>
+          <a:p>
+            <a:endParaRPr lang="en-US" dirty="0"/>
+          </a:p>
+        </p:txBody>
+      </p:sp>
+      <p:sp>
+        <p:nvSpPr>
+          <p:cNvPr id="5" name="Footer Placeholder 4"/>
+          <p:cNvSpPr>
+            <a:spLocks noGrp="1"/>
+          </p:cNvSpPr>
+          <p:nvPr>
+            <p:ph type="ftr" sz="quarter" idx="11"/>
+          </p:nvPr>
+        </p:nvSpPr>
+        <p:spPr/>
+        <p:txBody>
+          <a:bodyPr/>
+          <a:lstStyle/>
+          <a:p>
+            <a:pPr marL="398463" defTabSz="914099" eaLnBrk="0" hangingPunct="0"/>
+            <a:r>
+              <a:rPr lang="en-US" sz="400">
+                <a:gradFill>
+                  <a:gsLst>
+                    <a:gs pos="0">
+                      <a:schemeClr val="tx1"/>
+                    </a:gs>
+                    <a:gs pos="100000">
+                      <a:schemeClr val="tx1"/>
+                    </a:gs>
+                  </a:gsLst>
+                  <a:lin ang="5400000" scaled="0"/>
+                </a:gradFill>
+                <a:latin typeface="Segoe UI" pitchFamily="34" charset="0"/>
+                <a:ea typeface="Segoe UI" pitchFamily="34" charset="0"/>
+                <a:cs typeface="Segoe UI" pitchFamily="34" charset="0"/>
+              </a:rPr>
+              <a:t>© Microsoft Corporation. All rights reserved. </a:t>
+            </a:r>
+            <a:endParaRPr lang="en-US" sz="400" dirty="0">
+              <a:gradFill>
+                <a:gsLst>
+                  <a:gs pos="0">
+                    <a:schemeClr val="tx1"/>
+                  </a:gs>
+                  <a:gs pos="100000">
+                    <a:schemeClr val="tx1"/>
+                  </a:gs>
+                </a:gsLst>
+                <a:lin ang="5400000" scaled="0"/>
+              </a:gradFill>
+              <a:latin typeface="Segoe UI" pitchFamily="34" charset="0"/>
+              <a:ea typeface="Segoe UI" pitchFamily="34" charset="0"/>
+              <a:cs typeface="Segoe UI" pitchFamily="34" charset="0"/>
+            </a:endParaRPr>
+          </a:p>
+        </p:txBody>
+      </p:sp>
+      <p:sp>
+        <p:nvSpPr>
+          <p:cNvPr id="6" name="Date Placeholder 5"/>
+          <p:cNvSpPr>
+            <a:spLocks noGrp="1"/>
+          </p:cNvSpPr>
+          <p:nvPr>
+            <p:ph type="dt" idx="12"/>
+          </p:nvPr>
+        </p:nvSpPr>
+        <p:spPr/>
+        <p:txBody>
+          <a:bodyPr/>
+          <a:lstStyle/>
+          <a:p>
+            <a:fld id="{196BB360-4395-422C-A729-CB974B278917}" type="datetime8">
+              <a:rPr lang="en-US" smtClean="0"/>
+              <a:t>10/6/2016 9:08 PM</a:t>
+            </a:fld>
+            <a:endParaRPr lang="en-US" dirty="0"/>
+          </a:p>
+        </p:txBody>
+      </p:sp>
+      <p:sp>
+        <p:nvSpPr>
+          <p:cNvPr id="7" name="Slide Number Placeholder 6"/>
+          <p:cNvSpPr>
+            <a:spLocks noGrp="1"/>
+          </p:cNvSpPr>
+          <p:nvPr>
+            <p:ph type="sldNum" sz="quarter" idx="13"/>
+          </p:nvPr>
+        </p:nvSpPr>
+        <p:spPr/>
+        <p:txBody>
+          <a:bodyPr/>
+          <a:lstStyle/>
+          <a:p>
+            <a:fld id="{B4008EB6-D09E-4580-8CD6-DDB14511944F}" type="slidenum">
+              <a:rPr lang="en-US" smtClean="0"/>
+              <a:pPr/>
+              <a:t>5</a:t>
+            </a:fld>
+            <a:endParaRPr lang="en-US" dirty="0"/>
+          </a:p>
+        </p:txBody>
+      </p:sp>
+    </p:spTree>
+    <p:extLst>
+      <p:ext uri="{BB962C8B-B14F-4D97-AF65-F5344CB8AC3E}">
+        <p14:creationId xmlns:p14="http://schemas.microsoft.com/office/powerpoint/2010/main" val="2068757368"/>
       </p:ext>
     </p:extLst>
   </p:cSld>
@@ -13770,6 +13958,266 @@
 </p:sld>
 </file>
 
+<file path=ppt/slides/slide10.xml><?xml version="1.0" encoding="utf-8"?>
+<p:sld xmlns:a="http://schemas.openxmlformats.org/drawingml/2006/main" xmlns:r="http://schemas.openxmlformats.org/officeDocument/2006/relationships" xmlns:p="http://schemas.openxmlformats.org/presentationml/2006/main">
+  <p:cSld>
+    <p:spTree>
+      <p:nvGrpSpPr>
+        <p:cNvPr id="1" name=""/>
+        <p:cNvGrpSpPr/>
+        <p:nvPr/>
+      </p:nvGrpSpPr>
+      <p:grpSpPr>
+        <a:xfrm>
+          <a:off x="0" y="0"/>
+          <a:ext cx="0" cy="0"/>
+          <a:chOff x="0" y="0"/>
+          <a:chExt cx="0" cy="0"/>
+        </a:xfrm>
+      </p:grpSpPr>
+      <p:sp>
+        <p:nvSpPr>
+          <p:cNvPr id="3" name="Text Placeholder 2"/>
+          <p:cNvSpPr>
+            <a:spLocks noGrp="1"/>
+          </p:cNvSpPr>
+          <p:nvPr>
+            <p:ph type="body" sz="quarter" idx="10"/>
+          </p:nvPr>
+        </p:nvSpPr>
+        <p:spPr/>
+        <p:txBody>
+          <a:bodyPr/>
+          <a:lstStyle/>
+          <a:p>
+            <a:r>
+              <a:rPr lang="en-US"/>
+              <a:t>Create ARM template for web app in VS</a:t>
+            </a:r>
+          </a:p>
+          <a:p>
+            <a:r>
+              <a:rPr lang="en-US"/>
+              <a:t>Deploy using VSTS</a:t>
+            </a:r>
+          </a:p>
+          <a:p>
+            <a:r>
+              <a:rPr lang="en-US"/>
+              <a:t>Create 3 environments</a:t>
+            </a:r>
+          </a:p>
+          <a:p>
+            <a:r>
+              <a:rPr lang="en-US"/>
+              <a:t>Configure CD</a:t>
+            </a:r>
+          </a:p>
+          <a:p>
+            <a:endParaRPr lang="en-US" dirty="0"/>
+          </a:p>
+        </p:txBody>
+      </p:sp>
+      <p:sp>
+        <p:nvSpPr>
+          <p:cNvPr id="2" name="Title 1"/>
+          <p:cNvSpPr>
+            <a:spLocks noGrp="1"/>
+          </p:cNvSpPr>
+          <p:nvPr>
+            <p:ph type="title"/>
+          </p:nvPr>
+        </p:nvSpPr>
+        <p:spPr/>
+        <p:txBody>
+          <a:bodyPr/>
+          <a:lstStyle/>
+          <a:p>
+            <a:r>
+              <a:rPr lang="en-US"/>
+              <a:t>HOL 5: Infrastructure as code with (ARM)</a:t>
+            </a:r>
+            <a:endParaRPr lang="en-US" dirty="0"/>
+          </a:p>
+        </p:txBody>
+      </p:sp>
+    </p:spTree>
+    <p:extLst>
+      <p:ext uri="{BB962C8B-B14F-4D97-AF65-F5344CB8AC3E}">
+        <p14:creationId xmlns:p14="http://schemas.microsoft.com/office/powerpoint/2010/main" val="3620859700"/>
+      </p:ext>
+    </p:extLst>
+  </p:cSld>
+  <p:clrMapOvr>
+    <a:masterClrMapping/>
+  </p:clrMapOvr>
+  <p:transition>
+    <p:fade/>
+  </p:transition>
+</p:sld>
+</file>
+
+<file path=ppt/slides/slide11.xml><?xml version="1.0" encoding="utf-8"?>
+<p:sld xmlns:a="http://schemas.openxmlformats.org/drawingml/2006/main" xmlns:r="http://schemas.openxmlformats.org/officeDocument/2006/relationships" xmlns:p="http://schemas.openxmlformats.org/presentationml/2006/main">
+  <p:cSld>
+    <p:spTree>
+      <p:nvGrpSpPr>
+        <p:cNvPr id="1" name=""/>
+        <p:cNvGrpSpPr/>
+        <p:nvPr/>
+      </p:nvGrpSpPr>
+      <p:grpSpPr>
+        <a:xfrm>
+          <a:off x="0" y="0"/>
+          <a:ext cx="0" cy="0"/>
+          <a:chOff x="0" y="0"/>
+          <a:chExt cx="0" cy="0"/>
+        </a:xfrm>
+      </p:grpSpPr>
+      <p:sp>
+        <p:nvSpPr>
+          <p:cNvPr id="3" name="Text Placeholder 2"/>
+          <p:cNvSpPr>
+            <a:spLocks noGrp="1"/>
+          </p:cNvSpPr>
+          <p:nvPr>
+            <p:ph type="body" sz="quarter" idx="10"/>
+          </p:nvPr>
+        </p:nvSpPr>
+        <p:spPr/>
+        <p:txBody>
+          <a:bodyPr/>
+          <a:lstStyle/>
+          <a:p>
+            <a:r>
+              <a:rPr lang="en-US"/>
+              <a:t>Add App Insights resource to Azure</a:t>
+            </a:r>
+          </a:p>
+          <a:p>
+            <a:r>
+              <a:rPr lang="en-US"/>
+              <a:t>Add App Insights to application</a:t>
+            </a:r>
+          </a:p>
+          <a:p>
+            <a:r>
+              <a:rPr lang="en-US"/>
+              <a:t>Add server side SDK</a:t>
+            </a:r>
+          </a:p>
+          <a:p>
+            <a:r>
+              <a:rPr lang="en-US"/>
+              <a:t>Add client side libraries</a:t>
+            </a:r>
+          </a:p>
+          <a:p>
+            <a:r>
+              <a:rPr lang="en-US"/>
+              <a:t>Create custom events</a:t>
+            </a:r>
+          </a:p>
+          <a:p>
+            <a:r>
+              <a:rPr lang="en-US"/>
+              <a:t>Create custom metric</a:t>
+            </a:r>
+          </a:p>
+          <a:p>
+            <a:r>
+              <a:rPr lang="en-US"/>
+              <a:t>Create availability test</a:t>
+            </a:r>
+          </a:p>
+          <a:p>
+            <a:r>
+              <a:rPr lang="en-US"/>
+              <a:t>View the dashboard</a:t>
+            </a:r>
+            <a:endParaRPr lang="en-US" dirty="0"/>
+          </a:p>
+        </p:txBody>
+      </p:sp>
+      <p:sp>
+        <p:nvSpPr>
+          <p:cNvPr id="2" name="Title 1"/>
+          <p:cNvSpPr>
+            <a:spLocks noGrp="1"/>
+          </p:cNvSpPr>
+          <p:nvPr>
+            <p:ph type="title"/>
+          </p:nvPr>
+        </p:nvSpPr>
+        <p:spPr/>
+        <p:txBody>
+          <a:bodyPr>
+            <a:normAutofit fontScale="90000"/>
+          </a:bodyPr>
+          <a:lstStyle/>
+          <a:p>
+            <a:r>
+              <a:rPr lang="en-US" dirty="0"/>
+              <a:t>HOL 6: Monitoring applications with App Insights</a:t>
+            </a:r>
+          </a:p>
+          <a:p>
+            <a:endParaRPr lang="en-US" dirty="0"/>
+          </a:p>
+          <a:p>
+            <a:endParaRPr lang="en-US" dirty="0"/>
+          </a:p>
+        </p:txBody>
+      </p:sp>
+    </p:spTree>
+    <p:extLst>
+      <p:ext uri="{BB962C8B-B14F-4D97-AF65-F5344CB8AC3E}">
+        <p14:creationId xmlns:p14="http://schemas.microsoft.com/office/powerpoint/2010/main" val="2211970092"/>
+      </p:ext>
+    </p:extLst>
+  </p:cSld>
+  <p:clrMapOvr>
+    <a:masterClrMapping/>
+  </p:clrMapOvr>
+  <p:transition>
+    <p:fade/>
+  </p:transition>
+</p:sld>
+</file>
+
+<file path=ppt/slides/slide12.xml><?xml version="1.0" encoding="utf-8"?>
+<p:sld xmlns:a="http://schemas.openxmlformats.org/drawingml/2006/main" xmlns:r="http://schemas.openxmlformats.org/officeDocument/2006/relationships" xmlns:p="http://schemas.openxmlformats.org/presentationml/2006/main">
+  <p:cSld>
+    <p:spTree>
+      <p:nvGrpSpPr>
+        <p:cNvPr id="1" name=""/>
+        <p:cNvGrpSpPr/>
+        <p:nvPr/>
+      </p:nvGrpSpPr>
+      <p:grpSpPr>
+        <a:xfrm>
+          <a:off x="0" y="0"/>
+          <a:ext cx="0" cy="0"/>
+          <a:chOff x="0" y="0"/>
+          <a:chExt cx="0" cy="0"/>
+        </a:xfrm>
+      </p:grpSpPr>
+    </p:spTree>
+    <p:extLst>
+      <p:ext uri="{BB962C8B-B14F-4D97-AF65-F5344CB8AC3E}">
+        <p14:creationId xmlns:p14="http://schemas.microsoft.com/office/powerpoint/2010/main" val="3813053244"/>
+      </p:ext>
+    </p:extLst>
+  </p:cSld>
+  <p:clrMapOvr>
+    <a:masterClrMapping/>
+  </p:clrMapOvr>
+  <p:transition>
+    <p:fade/>
+  </p:transition>
+</p:sld>
+</file>
+
 <file path=ppt/slides/slide2.xml><?xml version="1.0" encoding="utf-8"?>
 <p:sld xmlns:a="http://schemas.openxmlformats.org/drawingml/2006/main" xmlns:r="http://schemas.openxmlformats.org/officeDocument/2006/relationships" xmlns:p="http://schemas.openxmlformats.org/presentationml/2006/main">
   <p:cSld>
@@ -13899,53 +14347,30 @@
           <a:chExt cx="0" cy="0"/>
         </a:xfrm>
       </p:grpSpPr>
-      <p:sp>
-        <p:nvSpPr>
-          <p:cNvPr id="2" name="Text Placeholder 1"/>
-          <p:cNvSpPr>
-            <a:spLocks noGrp="1"/>
-          </p:cNvSpPr>
-          <p:nvPr>
-            <p:ph type="body" sz="quarter" idx="10"/>
-          </p:nvPr>
-        </p:nvSpPr>
-        <p:spPr/>
-        <p:txBody>
-          <a:bodyPr/>
-          <a:lstStyle/>
-          <a:p>
-            <a:r>
-              <a:rPr lang="en-US"/>
-              <a:t>Connect Azure subscription (Pass or Trial)</a:t>
-            </a:r>
-          </a:p>
-          <a:p>
-            <a:r>
-              <a:rPr lang="en-US"/>
-              <a:t>Create O365 Developer Tenant</a:t>
-            </a:r>
-          </a:p>
-          <a:p>
-            <a:r>
-              <a:rPr lang="en-US"/>
-              <a:t>Create Visual Studio online account</a:t>
-            </a:r>
-          </a:p>
-          <a:p>
-            <a:r>
-              <a:rPr lang="en-US"/>
-              <a:t>Take prepared image, walk through the tools that are available</a:t>
-            </a:r>
-          </a:p>
-          <a:p>
-            <a:r>
-              <a:rPr lang="en-US"/>
-              <a:t>Run ARM Template to scaffold out resources</a:t>
-            </a:r>
-            <a:endParaRPr lang="en-US" dirty="0"/>
-          </a:p>
-        </p:txBody>
-      </p:sp>
+      <p:pic>
+        <p:nvPicPr>
+          <p:cNvPr id="2" name="Picture 1"/>
+          <p:cNvPicPr>
+            <a:picLocks noChangeAspect="1"/>
+          </p:cNvPicPr>
+          <p:nvPr/>
+        </p:nvPicPr>
+        <p:blipFill>
+          <a:blip r:embed="rId2"/>
+          <a:stretch>
+            <a:fillRect/>
+          </a:stretch>
+        </p:blipFill>
+        <p:spPr>
+          <a:xfrm>
+            <a:off x="540510" y="1160547"/>
+            <a:ext cx="11392728" cy="4281207"/>
+          </a:xfrm>
+          <a:prstGeom prst="rect">
+            <a:avLst/>
+          </a:prstGeom>
+        </p:spPr>
+      </p:pic>
       <p:sp>
         <p:nvSpPr>
           <p:cNvPr id="3" name="Title 2"/>
@@ -13962,17 +14387,16 @@
           <a:lstStyle/>
           <a:p>
             <a:r>
-              <a:rPr lang="en-US"/>
-              <a:t>HOL 1: Setting up your developer environment</a:t>
-            </a:r>
-            <a:endParaRPr lang="en-US" dirty="0"/>
+              <a:rPr lang="en-US" dirty="0"/>
+              <a:t>City Power &amp; Light Outage Incident Tracker</a:t>
+            </a:r>
           </a:p>
         </p:txBody>
       </p:sp>
     </p:spTree>
     <p:extLst>
       <p:ext uri="{BB962C8B-B14F-4D97-AF65-F5344CB8AC3E}">
-        <p14:creationId xmlns:p14="http://schemas.microsoft.com/office/powerpoint/2010/main" val="4222031049"/>
+        <p14:creationId xmlns:p14="http://schemas.microsoft.com/office/powerpoint/2010/main" val="690895196"/>
       </p:ext>
     </p:extLst>
   </p:cSld>
@@ -14002,99 +14426,236 @@
           <a:chExt cx="0" cy="0"/>
         </a:xfrm>
       </p:grpSpPr>
+      <p:pic>
+        <p:nvPicPr>
+          <p:cNvPr id="31" name="Picture 30"/>
+          <p:cNvPicPr>
+            <a:picLocks noChangeAspect="1"/>
+          </p:cNvPicPr>
+          <p:nvPr/>
+        </p:nvPicPr>
+        <p:blipFill>
+          <a:blip r:embed="rId3"/>
+          <a:stretch>
+            <a:fillRect/>
+          </a:stretch>
+        </p:blipFill>
+        <p:spPr>
+          <a:xfrm>
+            <a:off x="262618" y="270782"/>
+            <a:ext cx="4804064" cy="6352583"/>
+          </a:xfrm>
+          <a:prstGeom prst="rect">
+            <a:avLst/>
+          </a:prstGeom>
+        </p:spPr>
+      </p:pic>
       <p:sp>
         <p:nvSpPr>
-          <p:cNvPr id="3" name="Text Placeholder 2"/>
-          <p:cNvSpPr>
-            <a:spLocks noGrp="1"/>
-          </p:cNvSpPr>
-          <p:nvPr>
-            <p:ph type="body" sz="quarter" idx="10"/>
-          </p:nvPr>
+          <p:cNvPr id="24" name="Rectangle 23"/>
+          <p:cNvSpPr/>
+          <p:nvPr/>
         </p:nvSpPr>
-        <p:spPr/>
+        <p:spPr bwMode="auto">
+          <a:xfrm>
+            <a:off x="4694237" y="830262"/>
+            <a:ext cx="7742238" cy="5570251"/>
+          </a:xfrm>
+          <a:prstGeom prst="rect">
+            <a:avLst/>
+          </a:prstGeom>
+          <a:solidFill>
+            <a:schemeClr val="accent1"/>
+          </a:solidFill>
+          <a:ln w="9525" cap="flat" cmpd="sng" algn="ctr">
+            <a:noFill/>
+            <a:prstDash val="solid"/>
+            <a:headEnd type="none" w="med" len="med"/>
+            <a:tailEnd type="none" w="med" len="med"/>
+          </a:ln>
+          <a:effectLst/>
+        </p:spPr>
         <p:txBody>
-          <a:bodyPr/>
+          <a:bodyPr rot="0" spcFirstLastPara="0" vertOverflow="overflow" horzOverflow="overflow" vert="horz" wrap="square" lIns="182880" tIns="146304" rIns="182880" bIns="146304" numCol="1" spcCol="0" rtlCol="0" fromWordArt="0" anchor="t" anchorCtr="0" forceAA="0" compatLnSpc="1">
+            <a:prstTxWarp prst="textNoShape">
+              <a:avLst/>
+            </a:prstTxWarp>
+            <a:noAutofit/>
+          </a:bodyPr>
           <a:lstStyle/>
           <a:p>
-            <a:r>
-              <a:rPr lang="en-US" dirty="0"/>
-              <a:t>Starting with provisioned resource group</a:t>
-            </a:r>
-          </a:p>
-          <a:p>
-            <a:r>
-              <a:rPr lang="en-US" dirty="0"/>
-              <a:t>Select front end app (Node.js /.NET/ Java)</a:t>
-            </a:r>
-          </a:p>
-          <a:p>
-            <a:r>
-              <a:rPr lang="en-US" dirty="0"/>
-              <a:t>Connect to deployed API</a:t>
-            </a:r>
-          </a:p>
-          <a:p>
-            <a:r>
-              <a:rPr lang="en-US" dirty="0"/>
-              <a:t>Add blob storage</a:t>
-            </a:r>
-          </a:p>
-          <a:p>
-            <a:r>
-              <a:rPr lang="en-US" dirty="0"/>
-              <a:t>Add queueing</a:t>
-            </a:r>
-          </a:p>
-          <a:p>
-            <a:r>
-              <a:rPr lang="en-US" dirty="0"/>
-              <a:t>Add </a:t>
-            </a:r>
-            <a:r>
-              <a:rPr lang="en-US" dirty="0" err="1"/>
-              <a:t>Redis</a:t>
-            </a:r>
-            <a:r>
-              <a:rPr lang="en-US" dirty="0"/>
-              <a:t> cache</a:t>
-            </a:r>
-          </a:p>
-          <a:p>
-            <a:r>
-              <a:rPr lang="en-US" dirty="0"/>
-              <a:t>Stretch: Image resizing with Function</a:t>
-            </a:r>
-          </a:p>
-        </p:txBody>
-      </p:sp>
-      <p:sp>
-        <p:nvSpPr>
-          <p:cNvPr id="2" name="Title 1"/>
-          <p:cNvSpPr>
-            <a:spLocks noGrp="1"/>
-          </p:cNvSpPr>
-          <p:nvPr>
-            <p:ph type="title"/>
-          </p:nvPr>
-        </p:nvSpPr>
-        <p:spPr/>
-        <p:txBody>
-          <a:bodyPr/>
-          <a:lstStyle/>
-          <a:p>
-            <a:r>
-              <a:rPr lang="en-US"/>
-              <a:t>HOL 2: Building modern cloud apps</a:t>
-            </a:r>
-            <a:endParaRPr lang="en-US" dirty="0"/>
+            <a:pPr lvl="0" defTabSz="932472" fontAlgn="base">
+              <a:lnSpc>
+                <a:spcPct val="90000"/>
+              </a:lnSpc>
+              <a:spcBef>
+                <a:spcPct val="0"/>
+              </a:spcBef>
+              <a:spcAft>
+                <a:spcPct val="0"/>
+              </a:spcAft>
+              <a:defRPr/>
+            </a:pPr>
+            <a:r>
+              <a:rPr lang="en-US" sz="3200" dirty="0">
+                <a:solidFill>
+                  <a:schemeClr val="bg1"/>
+                </a:solidFill>
+              </a:rPr>
+              <a:t>City Power &amp; Light is looking to use cloud capabilities</a:t>
+            </a:r>
+          </a:p>
+          <a:p>
+            <a:pPr lvl="0" defTabSz="932472" fontAlgn="base">
+              <a:lnSpc>
+                <a:spcPct val="90000"/>
+              </a:lnSpc>
+              <a:spcBef>
+                <a:spcPct val="0"/>
+              </a:spcBef>
+              <a:spcAft>
+                <a:spcPct val="0"/>
+              </a:spcAft>
+              <a:defRPr/>
+            </a:pPr>
+            <a:endParaRPr lang="en-US" sz="3200" dirty="0">
+              <a:solidFill>
+                <a:schemeClr val="bg1"/>
+              </a:solidFill>
+            </a:endParaRPr>
+          </a:p>
+          <a:p>
+            <a:pPr lvl="0" defTabSz="932472" fontAlgn="base">
+              <a:lnSpc>
+                <a:spcPct val="90000"/>
+              </a:lnSpc>
+              <a:spcBef>
+                <a:spcPct val="0"/>
+              </a:spcBef>
+              <a:spcAft>
+                <a:spcPct val="0"/>
+              </a:spcAft>
+              <a:defRPr/>
+            </a:pPr>
+            <a:r>
+              <a:rPr lang="en-US" sz="3200" dirty="0">
+                <a:solidFill>
+                  <a:schemeClr val="bg1"/>
+                </a:solidFill>
+              </a:rPr>
+              <a:t>Would to allow field workers the ability capture incidents</a:t>
+            </a:r>
+          </a:p>
+          <a:p>
+            <a:pPr lvl="0" defTabSz="932472" fontAlgn="base">
+              <a:lnSpc>
+                <a:spcPct val="90000"/>
+              </a:lnSpc>
+              <a:spcBef>
+                <a:spcPct val="0"/>
+              </a:spcBef>
+              <a:spcAft>
+                <a:spcPct val="0"/>
+              </a:spcAft>
+              <a:defRPr/>
+            </a:pPr>
+            <a:endParaRPr lang="en-US" sz="3200" dirty="0">
+              <a:solidFill>
+                <a:schemeClr val="bg1"/>
+              </a:solidFill>
+            </a:endParaRPr>
+          </a:p>
+          <a:p>
+            <a:pPr lvl="0" defTabSz="932472" fontAlgn="base">
+              <a:lnSpc>
+                <a:spcPct val="90000"/>
+              </a:lnSpc>
+              <a:spcBef>
+                <a:spcPct val="0"/>
+              </a:spcBef>
+              <a:spcAft>
+                <a:spcPct val="0"/>
+              </a:spcAft>
+              <a:defRPr/>
+            </a:pPr>
+            <a:r>
+              <a:rPr lang="en-US" sz="3200" dirty="0">
+                <a:solidFill>
+                  <a:schemeClr val="bg1"/>
+                </a:solidFill>
+              </a:rPr>
+              <a:t>Would like to provide photo upload capability</a:t>
+            </a:r>
+          </a:p>
+          <a:p>
+            <a:pPr lvl="0" defTabSz="932472" fontAlgn="base">
+              <a:lnSpc>
+                <a:spcPct val="90000"/>
+              </a:lnSpc>
+              <a:spcBef>
+                <a:spcPct val="0"/>
+              </a:spcBef>
+              <a:spcAft>
+                <a:spcPct val="0"/>
+              </a:spcAft>
+              <a:defRPr/>
+            </a:pPr>
+            <a:endParaRPr lang="en-US" sz="3200" dirty="0">
+              <a:solidFill>
+                <a:schemeClr val="bg1"/>
+              </a:solidFill>
+            </a:endParaRPr>
+          </a:p>
+          <a:p>
+            <a:pPr lvl="0" defTabSz="932472" fontAlgn="base">
+              <a:lnSpc>
+                <a:spcPct val="90000"/>
+              </a:lnSpc>
+              <a:spcBef>
+                <a:spcPct val="0"/>
+              </a:spcBef>
+              <a:spcAft>
+                <a:spcPct val="0"/>
+              </a:spcAft>
+              <a:defRPr/>
+            </a:pPr>
+            <a:r>
+              <a:rPr lang="en-US" sz="3200" dirty="0">
+                <a:solidFill>
+                  <a:schemeClr val="bg1"/>
+                </a:solidFill>
+              </a:rPr>
+              <a:t>Would like to consume PaaS services on Azure</a:t>
+            </a:r>
+          </a:p>
+          <a:p>
+            <a:pPr lvl="0" defTabSz="932472" fontAlgn="base">
+              <a:lnSpc>
+                <a:spcPct val="90000"/>
+              </a:lnSpc>
+              <a:spcBef>
+                <a:spcPct val="0"/>
+              </a:spcBef>
+              <a:spcAft>
+                <a:spcPct val="0"/>
+              </a:spcAft>
+              <a:defRPr/>
+            </a:pPr>
+            <a:endParaRPr lang="en-US" sz="3200" dirty="0">
+              <a:solidFill>
+                <a:schemeClr val="bg1"/>
+              </a:solidFill>
+            </a:endParaRPr>
           </a:p>
         </p:txBody>
       </p:sp>
     </p:spTree>
+    <p:custDataLst>
+      <p:tags r:id="rId1"/>
+    </p:custDataLst>
     <p:extLst>
       <p:ext uri="{BB962C8B-B14F-4D97-AF65-F5344CB8AC3E}">
-        <p14:creationId xmlns:p14="http://schemas.microsoft.com/office/powerpoint/2010/main" val="103508438"/>
+        <p14:creationId xmlns:p14="http://schemas.microsoft.com/office/powerpoint/2010/main" val="1134360015"/>
       </p:ext>
     </p:extLst>
   </p:cSld>
@@ -14104,6 +14665,133 @@
   <p:transition>
     <p:fade/>
   </p:transition>
+  <p:timing>
+    <p:tnLst>
+      <p:par>
+        <p:cTn id="1" dur="indefinite" restart="never" nodeType="tmRoot">
+          <p:childTnLst>
+            <p:seq concurrent="1" nextAc="seek">
+              <p:cTn id="2" dur="indefinite" nodeType="mainSeq">
+                <p:childTnLst>
+                  <p:par>
+                    <p:cTn id="3" fill="hold">
+                      <p:stCondLst>
+                        <p:cond delay="indefinite"/>
+                        <p:cond evt="onBegin" delay="0">
+                          <p:tn val="2"/>
+                        </p:cond>
+                      </p:stCondLst>
+                      <p:childTnLst>
+                        <p:par>
+                          <p:cTn id="4" fill="hold">
+                            <p:stCondLst>
+                              <p:cond delay="0"/>
+                            </p:stCondLst>
+                            <p:childTnLst>
+                              <p:par>
+                                <p:cTn id="5" presetID="2" presetClass="entr" presetSubtype="2" decel="100000" fill="hold" grpId="0" nodeType="withEffect">
+                                  <p:stCondLst>
+                                    <p:cond delay="0"/>
+                                  </p:stCondLst>
+                                  <p:childTnLst>
+                                    <p:set>
+                                      <p:cBhvr>
+                                        <p:cTn id="6" dur="1" fill="hold">
+                                          <p:stCondLst>
+                                            <p:cond delay="0"/>
+                                          </p:stCondLst>
+                                        </p:cTn>
+                                        <p:tgtEl>
+                                          <p:spTgt spid="24"/>
+                                        </p:tgtEl>
+                                        <p:attrNameLst>
+                                          <p:attrName>style.visibility</p:attrName>
+                                        </p:attrNameLst>
+                                      </p:cBhvr>
+                                      <p:to>
+                                        <p:strVal val="visible"/>
+                                      </p:to>
+                                    </p:set>
+                                    <p:anim calcmode="lin" valueType="num">
+                                      <p:cBhvr additive="base">
+                                        <p:cTn id="7" dur="750" fill="hold"/>
+                                        <p:tgtEl>
+                                          <p:spTgt spid="24"/>
+                                        </p:tgtEl>
+                                        <p:attrNameLst>
+                                          <p:attrName>ppt_x</p:attrName>
+                                        </p:attrNameLst>
+                                      </p:cBhvr>
+                                      <p:tavLst>
+                                        <p:tav tm="0">
+                                          <p:val>
+                                            <p:strVal val="1+#ppt_w/2"/>
+                                          </p:val>
+                                        </p:tav>
+                                        <p:tav tm="100000">
+                                          <p:val>
+                                            <p:strVal val="#ppt_x"/>
+                                          </p:val>
+                                        </p:tav>
+                                      </p:tavLst>
+                                    </p:anim>
+                                    <p:anim calcmode="lin" valueType="num">
+                                      <p:cBhvr additive="base">
+                                        <p:cTn id="8" dur="750" fill="hold"/>
+                                        <p:tgtEl>
+                                          <p:spTgt spid="24"/>
+                                        </p:tgtEl>
+                                        <p:attrNameLst>
+                                          <p:attrName>ppt_y</p:attrName>
+                                        </p:attrNameLst>
+                                      </p:cBhvr>
+                                      <p:tavLst>
+                                        <p:tav tm="0">
+                                          <p:val>
+                                            <p:strVal val="#ppt_y"/>
+                                          </p:val>
+                                        </p:tav>
+                                        <p:tav tm="100000">
+                                          <p:val>
+                                            <p:strVal val="#ppt_y"/>
+                                          </p:val>
+                                        </p:tav>
+                                      </p:tavLst>
+                                    </p:anim>
+                                  </p:childTnLst>
+                                </p:cTn>
+                              </p:par>
+                            </p:childTnLst>
+                          </p:cTn>
+                        </p:par>
+                      </p:childTnLst>
+                    </p:cTn>
+                  </p:par>
+                </p:childTnLst>
+              </p:cTn>
+              <p:prevCondLst>
+                <p:cond evt="onPrev" delay="0">
+                  <p:tgtEl>
+                    <p:sldTgt/>
+                  </p:tgtEl>
+                </p:cond>
+              </p:prevCondLst>
+              <p:nextCondLst>
+                <p:cond evt="onNext" delay="0">
+                  <p:tgtEl>
+                    <p:sldTgt/>
+                  </p:tgtEl>
+                </p:cond>
+              </p:nextCondLst>
+            </p:seq>
+          </p:childTnLst>
+        </p:cTn>
+      </p:par>
+    </p:tnLst>
+    <p:bldLst>
+      <p:bldP spid="24" grpId="0" animBg="1"/>
+    </p:bldLst>
+  </p:timing>
 </p:sld>
 </file>
 
@@ -14124,78 +14812,688 @@
           <a:chExt cx="0" cy="0"/>
         </a:xfrm>
       </p:grpSpPr>
-      <p:sp>
-        <p:nvSpPr>
-          <p:cNvPr id="3" name="Text Placeholder 2"/>
-          <p:cNvSpPr>
-            <a:spLocks noGrp="1"/>
-          </p:cNvSpPr>
-          <p:nvPr>
-            <p:ph type="body" sz="quarter" idx="10"/>
-          </p:nvPr>
-        </p:nvSpPr>
-        <p:spPr/>
-        <p:txBody>
-          <a:bodyPr>
-            <a:normAutofit fontScale="40000" lnSpcReduction="20000"/>
-          </a:bodyPr>
-          <a:lstStyle/>
-          <a:p>
-            <a:r>
-              <a:rPr lang="en-US" dirty="0"/>
-              <a:t>Find AD </a:t>
-            </a:r>
-          </a:p>
-          <a:p>
-            <a:r>
-              <a:rPr lang="en-US" dirty="0"/>
-              <a:t>Create AD Application</a:t>
-            </a:r>
-          </a:p>
-          <a:p>
-            <a:r>
-              <a:rPr lang="en-US" dirty="0"/>
-              <a:t>Add authentication to app</a:t>
-            </a:r>
-          </a:p>
-          <a:p>
-            <a:r>
-              <a:rPr lang="en-US" dirty="0"/>
-              <a:t>Authenticate</a:t>
-            </a:r>
-          </a:p>
-          <a:p>
-            <a:r>
-              <a:rPr lang="en-US" dirty="0"/>
-              <a:t>Add profile page</a:t>
-            </a:r>
-          </a:p>
-          <a:p>
-            <a:r>
-              <a:rPr lang="en-US" dirty="0"/>
-              <a:t>Add graph API call to get user data for profile page</a:t>
-            </a:r>
-          </a:p>
-          <a:p>
-            <a:r>
-              <a:rPr lang="en-US" dirty="0"/>
-              <a:t>Populate first &amp; last name of the new incident form with first name &amp; last name from Graph/token</a:t>
-            </a:r>
-          </a:p>
-          <a:p>
-            <a:r>
-              <a:rPr lang="en-US" dirty="0"/>
-              <a:t>Send Email via Graph on new incident creation</a:t>
-            </a:r>
-          </a:p>
-          <a:p>
-            <a:r>
-              <a:rPr lang="en-US" dirty="0"/>
-              <a:t>Stretch: Add calendar event on new incident creation</a:t>
-            </a:r>
-          </a:p>
-        </p:txBody>
-      </p:sp>
+      <p:grpSp>
+        <p:nvGrpSpPr>
+          <p:cNvPr id="30" name="Group 29"/>
+          <p:cNvGrpSpPr/>
+          <p:nvPr/>
+        </p:nvGrpSpPr>
+        <p:grpSpPr>
+          <a:xfrm>
+            <a:off x="324895" y="1188780"/>
+            <a:ext cx="2296022" cy="2921964"/>
+            <a:chOff x="324895" y="1188780"/>
+            <a:chExt cx="2296022" cy="2921964"/>
+          </a:xfrm>
+        </p:grpSpPr>
+        <p:pic>
+          <p:nvPicPr>
+            <p:cNvPr id="67" name="Picture 66"/>
+            <p:cNvPicPr>
+              <a:picLocks noChangeAspect="1"/>
+            </p:cNvPicPr>
+            <p:nvPr/>
+          </p:nvPicPr>
+          <p:blipFill>
+            <a:blip r:embed="rId4">
+              <a:clrChange>
+                <a:clrFrom>
+                  <a:srgbClr val="FFFFFF"/>
+                </a:clrFrom>
+                <a:clrTo>
+                  <a:srgbClr val="FFFFFF">
+                    <a:alpha val="0"/>
+                  </a:srgbClr>
+                </a:clrTo>
+              </a:clrChange>
+            </a:blip>
+            <a:stretch>
+              <a:fillRect/>
+            </a:stretch>
+          </p:blipFill>
+          <p:spPr>
+            <a:xfrm>
+              <a:off x="1371778" y="2827941"/>
+              <a:ext cx="1092527" cy="970570"/>
+            </a:xfrm>
+            <a:prstGeom prst="rect">
+              <a:avLst/>
+            </a:prstGeom>
+          </p:spPr>
+        </p:pic>
+        <p:grpSp>
+          <p:nvGrpSpPr>
+            <p:cNvPr id="3" name="Group 2"/>
+            <p:cNvGrpSpPr/>
+            <p:nvPr/>
+          </p:nvGrpSpPr>
+          <p:grpSpPr>
+            <a:xfrm>
+              <a:off x="373232" y="1549779"/>
+              <a:ext cx="1027357" cy="646272"/>
+              <a:chOff x="251502" y="1176974"/>
+              <a:chExt cx="1559428" cy="980978"/>
+            </a:xfrm>
+          </p:grpSpPr>
+          <p:pic>
+            <p:nvPicPr>
+              <p:cNvPr id="82" name="Picture 10" descr="Image result for user with pc icon"/>
+              <p:cNvPicPr>
+                <a:picLocks noChangeAspect="1" noChangeArrowheads="1"/>
+              </p:cNvPicPr>
+              <p:nvPr/>
+            </p:nvPicPr>
+            <p:blipFill>
+              <a:blip r:embed="rId5">
+                <a:duotone>
+                  <a:schemeClr val="accent3">
+                    <a:shade val="45000"/>
+                    <a:satMod val="135000"/>
+                  </a:schemeClr>
+                  <a:prstClr val="white"/>
+                </a:duotone>
+                <a:extLst>
+                  <a:ext uri="{28A0092B-C50C-407E-A947-70E740481C1C}">
+                    <a14:useLocalDpi xmlns:a14="http://schemas.microsoft.com/office/drawing/2010/main" val="0"/>
+                  </a:ext>
+                </a:extLst>
+              </a:blip>
+              <a:srcRect/>
+              <a:stretch>
+                <a:fillRect/>
+              </a:stretch>
+            </p:blipFill>
+            <p:spPr bwMode="auto">
+              <a:xfrm>
+                <a:off x="1040625" y="1195069"/>
+                <a:ext cx="770305" cy="962883"/>
+              </a:xfrm>
+              <a:prstGeom prst="rect">
+                <a:avLst/>
+              </a:prstGeom>
+              <a:noFill/>
+              <a:extLst>
+                <a:ext uri="{909E8E84-426E-40DD-AFC4-6F175D3DCCD1}">
+                  <a14:hiddenFill xmlns:a14="http://schemas.microsoft.com/office/drawing/2010/main">
+                    <a:solidFill>
+                      <a:srgbClr val="FFFFFF"/>
+                    </a:solidFill>
+                  </a14:hiddenFill>
+                </a:ext>
+              </a:extLst>
+            </p:spPr>
+          </p:pic>
+          <p:pic>
+            <p:nvPicPr>
+              <p:cNvPr id="84" name="Picture 12" descr="Image result for user with phone icon"/>
+              <p:cNvPicPr>
+                <a:picLocks noChangeAspect="1" noChangeArrowheads="1"/>
+              </p:cNvPicPr>
+              <p:nvPr/>
+            </p:nvPicPr>
+            <p:blipFill>
+              <a:blip r:embed="rId6">
+                <a:duotone>
+                  <a:schemeClr val="accent3">
+                    <a:shade val="45000"/>
+                    <a:satMod val="135000"/>
+                  </a:schemeClr>
+                  <a:prstClr val="white"/>
+                </a:duotone>
+                <a:extLst>
+                  <a:ext uri="{28A0092B-C50C-407E-A947-70E740481C1C}">
+                    <a14:useLocalDpi xmlns:a14="http://schemas.microsoft.com/office/drawing/2010/main" val="0"/>
+                  </a:ext>
+                </a:extLst>
+              </a:blip>
+              <a:srcRect/>
+              <a:stretch>
+                <a:fillRect/>
+              </a:stretch>
+            </p:blipFill>
+            <p:spPr bwMode="auto">
+              <a:xfrm>
+                <a:off x="251502" y="1176974"/>
+                <a:ext cx="870147" cy="870147"/>
+              </a:xfrm>
+              <a:prstGeom prst="rect">
+                <a:avLst/>
+              </a:prstGeom>
+              <a:noFill/>
+              <a:extLst>
+                <a:ext uri="{909E8E84-426E-40DD-AFC4-6F175D3DCCD1}">
+                  <a14:hiddenFill xmlns:a14="http://schemas.microsoft.com/office/drawing/2010/main">
+                    <a:solidFill>
+                      <a:srgbClr val="FFFFFF"/>
+                    </a:solidFill>
+                  </a14:hiddenFill>
+                </a:ext>
+              </a:extLst>
+            </p:spPr>
+          </p:pic>
+        </p:grpSp>
+        <p:cxnSp>
+          <p:nvCxnSpPr>
+            <p:cNvPr id="85" name="Connector: Elbow 84"/>
+            <p:cNvCxnSpPr>
+              <a:cxnSpLocks/>
+              <a:stCxn id="88" idx="4"/>
+              <a:endCxn id="67" idx="1"/>
+            </p:cNvCxnSpPr>
+            <p:nvPr/>
+          </p:nvCxnSpPr>
+          <p:spPr>
+            <a:xfrm rot="16200000" flipH="1">
+              <a:off x="780358" y="2721806"/>
+              <a:ext cx="697972" cy="484867"/>
+            </a:xfrm>
+            <a:prstGeom prst="bentConnector2">
+              <a:avLst/>
+            </a:prstGeom>
+            <a:ln w="15875" cap="sq">
+              <a:solidFill>
+                <a:schemeClr val="tx1"/>
+              </a:solidFill>
+              <a:miter lim="800000"/>
+              <a:tailEnd type="triangle"/>
+            </a:ln>
+          </p:spPr>
+          <p:style>
+            <a:lnRef idx="1">
+              <a:schemeClr val="accent1"/>
+            </a:lnRef>
+            <a:fillRef idx="0">
+              <a:schemeClr val="accent1"/>
+            </a:fillRef>
+            <a:effectRef idx="0">
+              <a:schemeClr val="accent1"/>
+            </a:effectRef>
+            <a:fontRef idx="minor">
+              <a:schemeClr val="tx1"/>
+            </a:fontRef>
+          </p:style>
+        </p:cxnSp>
+        <p:sp>
+          <p:nvSpPr>
+            <p:cNvPr id="86" name="Rectangle 85"/>
+            <p:cNvSpPr/>
+            <p:nvPr/>
+          </p:nvSpPr>
+          <p:spPr>
+            <a:xfrm>
+              <a:off x="324895" y="3519813"/>
+              <a:ext cx="1123126" cy="590931"/>
+            </a:xfrm>
+            <a:prstGeom prst="rect">
+              <a:avLst/>
+            </a:prstGeom>
+            <a:solidFill>
+              <a:schemeClr val="accent2"/>
+            </a:solidFill>
+            <a:ln>
+              <a:noFill/>
+            </a:ln>
+          </p:spPr>
+          <p:style>
+            <a:lnRef idx="0">
+              <a:scrgbClr r="0" g="0" b="0"/>
+            </a:lnRef>
+            <a:fillRef idx="0">
+              <a:scrgbClr r="0" g="0" b="0"/>
+            </a:fillRef>
+            <a:effectRef idx="0">
+              <a:scrgbClr r="0" g="0" b="0"/>
+            </a:effectRef>
+            <a:fontRef idx="minor">
+              <a:schemeClr val="lt1"/>
+            </a:fontRef>
+          </p:style>
+          <p:txBody>
+            <a:bodyPr wrap="square" rtlCol="0" anchor="ctr">
+              <a:spAutoFit/>
+            </a:bodyPr>
+            <a:lstStyle/>
+            <a:p>
+              <a:pPr marL="0" marR="0" lvl="0" indent="0" algn="ctr" defTabSz="914400" eaLnBrk="1" fontAlgn="auto" latinLnBrk="0" hangingPunct="1">
+                <a:lnSpc>
+                  <a:spcPct val="90000"/>
+                </a:lnSpc>
+                <a:spcBef>
+                  <a:spcPts val="0"/>
+                </a:spcBef>
+                <a:spcAft>
+                  <a:spcPts val="0"/>
+                </a:spcAft>
+                <a:buClrTx/>
+                <a:buSzTx/>
+                <a:buFontTx/>
+                <a:buNone/>
+                <a:tabLst/>
+                <a:defRPr/>
+              </a:pPr>
+              <a:r>
+                <a:rPr lang="en-US" dirty="0"/>
+                <a:t>Outage Tracker</a:t>
+              </a:r>
+            </a:p>
+          </p:txBody>
+        </p:sp>
+        <p:sp>
+          <p:nvSpPr>
+            <p:cNvPr id="87" name="TextBox 86"/>
+            <p:cNvSpPr txBox="1"/>
+            <p:nvPr/>
+          </p:nvSpPr>
+          <p:spPr>
+            <a:xfrm>
+              <a:off x="379444" y="1188780"/>
+              <a:ext cx="1014933" cy="369332"/>
+            </a:xfrm>
+            <a:prstGeom prst="rect">
+              <a:avLst/>
+            </a:prstGeom>
+            <a:noFill/>
+          </p:spPr>
+          <p:txBody>
+            <a:bodyPr wrap="square" rtlCol="0">
+              <a:spAutoFit/>
+            </a:bodyPr>
+            <a:lstStyle/>
+            <a:p>
+              <a:pPr marL="0" marR="0" lvl="0" indent="0" algn="ctr" defTabSz="914400" eaLnBrk="1" fontAlgn="auto" latinLnBrk="0" hangingPunct="1">
+                <a:lnSpc>
+                  <a:spcPct val="100000"/>
+                </a:lnSpc>
+                <a:spcBef>
+                  <a:spcPts val="0"/>
+                </a:spcBef>
+                <a:spcAft>
+                  <a:spcPts val="0"/>
+                </a:spcAft>
+                <a:buClrTx/>
+                <a:buSzTx/>
+                <a:buFontTx/>
+                <a:buNone/>
+                <a:tabLst/>
+                <a:defRPr/>
+              </a:pPr>
+              <a:r>
+                <a:rPr kumimoji="0" lang="en-US" sz="1800" b="1" i="0" u="none" strike="noStrike" kern="0" cap="none" spc="0" normalizeH="0" baseline="0" noProof="0" dirty="0">
+                  <a:ln>
+                    <a:noFill/>
+                  </a:ln>
+                  <a:solidFill>
+                    <a:schemeClr val="tx2"/>
+                  </a:solidFill>
+                  <a:effectLst/>
+                  <a:uLnTx/>
+                  <a:uFillTx/>
+                  <a:latin typeface="Segoe UI Semibold" panose="020B0702040204020203" pitchFamily="34" charset="0"/>
+                  <a:cs typeface="Segoe UI" panose="020B0502040204020203" pitchFamily="34" charset="0"/>
+                </a:rPr>
+                <a:t>START</a:t>
+              </a:r>
+            </a:p>
+          </p:txBody>
+        </p:sp>
+        <p:sp>
+          <p:nvSpPr>
+            <p:cNvPr id="88" name="Oval 87"/>
+            <p:cNvSpPr/>
+            <p:nvPr/>
+          </p:nvSpPr>
+          <p:spPr>
+            <a:xfrm>
+              <a:off x="664862" y="2189125"/>
+              <a:ext cx="444097" cy="426129"/>
+            </a:xfrm>
+            <a:prstGeom prst="ellipse">
+              <a:avLst/>
+            </a:prstGeom>
+            <a:solidFill>
+              <a:schemeClr val="accent1"/>
+            </a:solidFill>
+            <a:ln w="25400">
+              <a:noFill/>
+            </a:ln>
+          </p:spPr>
+          <p:style>
+            <a:lnRef idx="2">
+              <a:schemeClr val="accent1">
+                <a:shade val="50000"/>
+              </a:schemeClr>
+            </a:lnRef>
+            <a:fillRef idx="1">
+              <a:schemeClr val="accent1"/>
+            </a:fillRef>
+            <a:effectRef idx="0">
+              <a:schemeClr val="accent1"/>
+            </a:effectRef>
+            <a:fontRef idx="minor">
+              <a:schemeClr val="lt1"/>
+            </a:fontRef>
+          </p:style>
+          <p:txBody>
+            <a:bodyPr rtlCol="0" anchor="ctr"/>
+            <a:lstStyle/>
+            <a:p>
+              <a:pPr marL="0" marR="0" lvl="0" indent="0" algn="ctr" defTabSz="914400" eaLnBrk="1" fontAlgn="auto" latinLnBrk="0" hangingPunct="1">
+                <a:lnSpc>
+                  <a:spcPct val="100000"/>
+                </a:lnSpc>
+                <a:spcBef>
+                  <a:spcPts val="0"/>
+                </a:spcBef>
+                <a:spcAft>
+                  <a:spcPts val="0"/>
+                </a:spcAft>
+                <a:buClrTx/>
+                <a:buSzTx/>
+                <a:buFontTx/>
+                <a:buNone/>
+                <a:tabLst/>
+                <a:defRPr/>
+              </a:pPr>
+              <a:r>
+                <a:rPr kumimoji="0" lang="en-US" sz="2000" b="0" i="0" u="none" strike="noStrike" kern="0" cap="none" spc="0" normalizeH="0" baseline="0" noProof="0" dirty="0">
+                  <a:ln>
+                    <a:noFill/>
+                  </a:ln>
+                  <a:solidFill>
+                    <a:schemeClr val="bg1"/>
+                  </a:solidFill>
+                  <a:effectLst/>
+                  <a:uLnTx/>
+                  <a:uFillTx/>
+                  <a:latin typeface="Segoe UI Semibold" panose="020B0702040204020203" pitchFamily="34" charset="0"/>
+                </a:rPr>
+                <a:t>1</a:t>
+              </a:r>
+            </a:p>
+          </p:txBody>
+        </p:sp>
+        <p:sp>
+          <p:nvSpPr>
+            <p:cNvPr id="89" name="TextBox 88"/>
+            <p:cNvSpPr txBox="1"/>
+            <p:nvPr/>
+          </p:nvSpPr>
+          <p:spPr>
+            <a:xfrm>
+              <a:off x="1194021" y="2515459"/>
+              <a:ext cx="1426896" cy="369332"/>
+            </a:xfrm>
+            <a:prstGeom prst="rect">
+              <a:avLst/>
+            </a:prstGeom>
+            <a:noFill/>
+          </p:spPr>
+          <p:txBody>
+            <a:bodyPr wrap="square" rtlCol="0">
+              <a:spAutoFit/>
+            </a:bodyPr>
+            <a:lstStyle/>
+            <a:p>
+              <a:pPr marL="0" marR="0" lvl="0" indent="0" algn="ctr" defTabSz="914400" eaLnBrk="1" fontAlgn="auto" latinLnBrk="0" hangingPunct="1">
+                <a:lnSpc>
+                  <a:spcPct val="100000"/>
+                </a:lnSpc>
+                <a:spcBef>
+                  <a:spcPts val="0"/>
+                </a:spcBef>
+                <a:spcAft>
+                  <a:spcPts val="0"/>
+                </a:spcAft>
+                <a:buClrTx/>
+                <a:buSzTx/>
+                <a:buFontTx/>
+                <a:buNone/>
+                <a:tabLst/>
+                <a:defRPr/>
+              </a:pPr>
+              <a:r>
+                <a:rPr kumimoji="0" lang="en-US" sz="1800" b="0" i="0" u="none" strike="noStrike" kern="0" cap="none" spc="0" normalizeH="0" baseline="0" noProof="0" dirty="0">
+                  <a:ln>
+                    <a:noFill/>
+                  </a:ln>
+                  <a:solidFill>
+                    <a:schemeClr val="accent1"/>
+                  </a:solidFill>
+                  <a:effectLst/>
+                  <a:uLnTx/>
+                  <a:uFillTx/>
+                  <a:latin typeface="Segoe UI Semibold" panose="020B0702040204020203" pitchFamily="34" charset="0"/>
+                  <a:cs typeface="Segoe UI" panose="020B0502040204020203" pitchFamily="34" charset="0"/>
+                </a:rPr>
+                <a:t>WEB SITE</a:t>
+              </a:r>
+            </a:p>
+          </p:txBody>
+        </p:sp>
+      </p:grpSp>
+      <p:grpSp>
+        <p:nvGrpSpPr>
+          <p:cNvPr id="34" name="Group 33"/>
+          <p:cNvGrpSpPr/>
+          <p:nvPr/>
+        </p:nvGrpSpPr>
+        <p:grpSpPr>
+          <a:xfrm>
+            <a:off x="2620917" y="1373446"/>
+            <a:ext cx="2392121" cy="1512315"/>
+            <a:chOff x="2465397" y="2233620"/>
+            <a:chExt cx="2392121" cy="1512315"/>
+          </a:xfrm>
+        </p:grpSpPr>
+        <p:pic>
+          <p:nvPicPr>
+            <p:cNvPr id="113" name="Picture 112"/>
+            <p:cNvPicPr>
+              <a:picLocks noChangeAspect="1"/>
+            </p:cNvPicPr>
+            <p:nvPr/>
+          </p:nvPicPr>
+          <p:blipFill>
+            <a:blip r:embed="rId7">
+              <a:clrChange>
+                <a:clrFrom>
+                  <a:srgbClr val="FFFFFF"/>
+                </a:clrFrom>
+                <a:clrTo>
+                  <a:srgbClr val="FFFFFF">
+                    <a:alpha val="0"/>
+                  </a:srgbClr>
+                </a:clrTo>
+              </a:clrChange>
+            </a:blip>
+            <a:stretch>
+              <a:fillRect/>
+            </a:stretch>
+          </p:blipFill>
+          <p:spPr>
+            <a:xfrm>
+              <a:off x="3367790" y="2880517"/>
+              <a:ext cx="927234" cy="865418"/>
+            </a:xfrm>
+            <a:prstGeom prst="rect">
+              <a:avLst/>
+            </a:prstGeom>
+          </p:spPr>
+        </p:pic>
+        <p:cxnSp>
+          <p:nvCxnSpPr>
+            <p:cNvPr id="114" name="Straight Arrow Connector 113"/>
+            <p:cNvCxnSpPr>
+              <a:cxnSpLocks/>
+            </p:cNvCxnSpPr>
+            <p:nvPr/>
+          </p:nvCxnSpPr>
+          <p:spPr>
+            <a:xfrm>
+              <a:off x="2465397" y="3313226"/>
+              <a:ext cx="902393" cy="0"/>
+            </a:xfrm>
+            <a:prstGeom prst="straightConnector1">
+              <a:avLst/>
+            </a:prstGeom>
+            <a:ln w="15875" cap="sq">
+              <a:solidFill>
+                <a:schemeClr val="tx1"/>
+              </a:solidFill>
+              <a:miter lim="800000"/>
+              <a:tailEnd type="triangle"/>
+            </a:ln>
+          </p:spPr>
+          <p:style>
+            <a:lnRef idx="1">
+              <a:schemeClr val="accent1"/>
+            </a:lnRef>
+            <a:fillRef idx="0">
+              <a:schemeClr val="accent1"/>
+            </a:fillRef>
+            <a:effectRef idx="0">
+              <a:schemeClr val="accent1"/>
+            </a:effectRef>
+            <a:fontRef idx="minor">
+              <a:schemeClr val="tx1"/>
+            </a:fontRef>
+          </p:style>
+        </p:cxnSp>
+        <p:sp>
+          <p:nvSpPr>
+            <p:cNvPr id="115" name="TextBox 114"/>
+            <p:cNvSpPr txBox="1"/>
+            <p:nvPr/>
+          </p:nvSpPr>
+          <p:spPr>
+            <a:xfrm>
+              <a:off x="3362057" y="2233620"/>
+              <a:ext cx="1495461" cy="646331"/>
+            </a:xfrm>
+            <a:prstGeom prst="rect">
+              <a:avLst/>
+            </a:prstGeom>
+            <a:noFill/>
+          </p:spPr>
+          <p:txBody>
+            <a:bodyPr wrap="square" rtlCol="0">
+              <a:spAutoFit/>
+            </a:bodyPr>
+            <a:lstStyle/>
+            <a:p>
+              <a:pPr marL="0" marR="0" lvl="0" indent="0" defTabSz="914400" eaLnBrk="1" fontAlgn="auto" latinLnBrk="0" hangingPunct="1">
+                <a:lnSpc>
+                  <a:spcPct val="100000"/>
+                </a:lnSpc>
+                <a:spcBef>
+                  <a:spcPts val="0"/>
+                </a:spcBef>
+                <a:spcAft>
+                  <a:spcPts val="0"/>
+                </a:spcAft>
+                <a:buClrTx/>
+                <a:buSzTx/>
+                <a:buFontTx/>
+                <a:buNone/>
+                <a:tabLst/>
+                <a:defRPr/>
+              </a:pPr>
+              <a:r>
+                <a:rPr kumimoji="0" lang="en-US" sz="1800" b="0" i="0" u="none" strike="noStrike" kern="0" cap="none" spc="0" normalizeH="0" baseline="0" noProof="0" dirty="0">
+                  <a:ln>
+                    <a:noFill/>
+                  </a:ln>
+                  <a:solidFill>
+                    <a:schemeClr val="accent1"/>
+                  </a:solidFill>
+                  <a:effectLst/>
+                  <a:uLnTx/>
+                  <a:uFillTx/>
+                  <a:latin typeface="Segoe UI Semibold" panose="020B0702040204020203" pitchFamily="34" charset="0"/>
+                  <a:cs typeface="Segoe UI" panose="020B0502040204020203" pitchFamily="34" charset="0"/>
+                </a:rPr>
+                <a:t>AZURE QUEUE</a:t>
+              </a:r>
+            </a:p>
+          </p:txBody>
+        </p:sp>
+        <p:sp>
+          <p:nvSpPr>
+            <p:cNvPr id="116" name="Oval 115"/>
+            <p:cNvSpPr/>
+            <p:nvPr/>
+          </p:nvSpPr>
+          <p:spPr>
+            <a:xfrm>
+              <a:off x="2912356" y="2343721"/>
+              <a:ext cx="444097" cy="426129"/>
+            </a:xfrm>
+            <a:prstGeom prst="ellipse">
+              <a:avLst/>
+            </a:prstGeom>
+            <a:solidFill>
+              <a:schemeClr val="tx2"/>
+            </a:solidFill>
+            <a:ln w="25400">
+              <a:noFill/>
+            </a:ln>
+          </p:spPr>
+          <p:style>
+            <a:lnRef idx="2">
+              <a:schemeClr val="accent1">
+                <a:shade val="50000"/>
+              </a:schemeClr>
+            </a:lnRef>
+            <a:fillRef idx="1">
+              <a:schemeClr val="accent1"/>
+            </a:fillRef>
+            <a:effectRef idx="0">
+              <a:schemeClr val="accent1"/>
+            </a:effectRef>
+            <a:fontRef idx="minor">
+              <a:schemeClr val="lt1"/>
+            </a:fontRef>
+          </p:style>
+          <p:txBody>
+            <a:bodyPr rtlCol="0" anchor="ctr"/>
+            <a:lstStyle/>
+            <a:p>
+              <a:pPr marL="0" marR="0" lvl="0" indent="0" algn="ctr" defTabSz="914400" eaLnBrk="1" fontAlgn="auto" latinLnBrk="0" hangingPunct="1">
+                <a:lnSpc>
+                  <a:spcPct val="100000"/>
+                </a:lnSpc>
+                <a:spcBef>
+                  <a:spcPts val="0"/>
+                </a:spcBef>
+                <a:spcAft>
+                  <a:spcPts val="0"/>
+                </a:spcAft>
+                <a:buClrTx/>
+                <a:buSzTx/>
+                <a:buFontTx/>
+                <a:buNone/>
+                <a:tabLst/>
+                <a:defRPr/>
+              </a:pPr>
+              <a:r>
+                <a:rPr kumimoji="0" lang="en-US" sz="2000" b="0" i="0" u="none" strike="noStrike" kern="0" cap="none" spc="0" normalizeH="0" baseline="0" noProof="0" dirty="0">
+                  <a:ln>
+                    <a:noFill/>
+                  </a:ln>
+                  <a:solidFill>
+                    <a:schemeClr val="bg1"/>
+                  </a:solidFill>
+                  <a:effectLst/>
+                  <a:uLnTx/>
+                  <a:uFillTx/>
+                  <a:latin typeface="Segoe UI Semibold" panose="020B0702040204020203" pitchFamily="34" charset="0"/>
+                </a:rPr>
+                <a:t>3</a:t>
+              </a:r>
+            </a:p>
+          </p:txBody>
+        </p:sp>
+      </p:grpSp>
       <p:sp>
         <p:nvSpPr>
           <p:cNvPr id="2" name="Title 1"/>
@@ -14208,22 +15506,804 @@
         </p:nvSpPr>
         <p:spPr/>
         <p:txBody>
-          <a:bodyPr>
-            <a:normAutofit fontScale="90000"/>
+          <a:bodyPr/>
+          <a:lstStyle/>
+          <a:p>
+            <a:r>
+              <a:rPr lang="en-US" dirty="0"/>
+              <a:t>City Power &amp; Light App Architecture</a:t>
+            </a:r>
+          </a:p>
+        </p:txBody>
+      </p:sp>
+      <p:pic>
+        <p:nvPicPr>
+          <p:cNvPr id="90" name="Picture 6"/>
+          <p:cNvPicPr>
+            <a:picLocks noChangeAspect="1"/>
+          </p:cNvPicPr>
+          <p:nvPr/>
+        </p:nvPicPr>
+        <p:blipFill>
+          <a:blip r:embed="rId8">
+            <a:extLst>
+              <a:ext uri="{28A0092B-C50C-407E-A947-70E740481C1C}">
+                <a14:useLocalDpi xmlns:a14="http://schemas.microsoft.com/office/drawing/2010/main" val="0"/>
+              </a:ext>
+            </a:extLst>
+          </a:blip>
+          <a:srcRect/>
+          <a:stretch>
+            <a:fillRect/>
+          </a:stretch>
+        </p:blipFill>
+        <p:spPr bwMode="auto">
+          <a:xfrm>
+            <a:off x="6599237" y="5030332"/>
+            <a:ext cx="500062" cy="546100"/>
+          </a:xfrm>
+          <a:prstGeom prst="rect">
+            <a:avLst/>
+          </a:prstGeom>
+          <a:noFill/>
+          <a:ln>
+            <a:noFill/>
+          </a:ln>
+          <a:extLst>
+            <a:ext uri="{909E8E84-426E-40DD-AFC4-6F175D3DCCD1}">
+              <a14:hiddenFill xmlns:a14="http://schemas.microsoft.com/office/drawing/2010/main">
+                <a:solidFill>
+                  <a:srgbClr val="FFFFFF"/>
+                </a:solidFill>
+              </a14:hiddenFill>
+            </a:ext>
+            <a:ext uri="{91240B29-F687-4F45-9708-019B960494DF}">
+              <a14:hiddenLine xmlns:a14="http://schemas.microsoft.com/office/drawing/2010/main" w="9525">
+                <a:solidFill>
+                  <a:srgbClr val="000000"/>
+                </a:solidFill>
+                <a:miter lim="800000"/>
+                <a:headEnd/>
+                <a:tailEnd/>
+              </a14:hiddenLine>
+            </a:ext>
+          </a:extLst>
+        </p:spPr>
+      </p:pic>
+      <p:pic>
+        <p:nvPicPr>
+          <p:cNvPr id="91" name="Picture 4"/>
+          <p:cNvPicPr>
+            <a:picLocks noChangeAspect="1"/>
+          </p:cNvPicPr>
+          <p:nvPr/>
+        </p:nvPicPr>
+        <p:blipFill>
+          <a:blip r:embed="rId9">
+            <a:extLst>
+              <a:ext uri="{28A0092B-C50C-407E-A947-70E740481C1C}">
+                <a14:useLocalDpi xmlns:a14="http://schemas.microsoft.com/office/drawing/2010/main" val="0"/>
+              </a:ext>
+            </a:extLst>
+          </a:blip>
+          <a:srcRect/>
+          <a:stretch>
+            <a:fillRect/>
+          </a:stretch>
+        </p:blipFill>
+        <p:spPr bwMode="auto">
+          <a:xfrm>
+            <a:off x="3700383" y="5125810"/>
+            <a:ext cx="549275" cy="547688"/>
+          </a:xfrm>
+          <a:prstGeom prst="rect">
+            <a:avLst/>
+          </a:prstGeom>
+          <a:noFill/>
+          <a:ln>
+            <a:noFill/>
+          </a:ln>
+          <a:extLst>
+            <a:ext uri="{909E8E84-426E-40DD-AFC4-6F175D3DCCD1}">
+              <a14:hiddenFill xmlns:a14="http://schemas.microsoft.com/office/drawing/2010/main">
+                <a:solidFill>
+                  <a:srgbClr val="FFFFFF"/>
+                </a:solidFill>
+              </a14:hiddenFill>
+            </a:ext>
+            <a:ext uri="{91240B29-F687-4F45-9708-019B960494DF}">
+              <a14:hiddenLine xmlns:a14="http://schemas.microsoft.com/office/drawing/2010/main" w="9525">
+                <a:solidFill>
+                  <a:srgbClr val="000000"/>
+                </a:solidFill>
+                <a:miter lim="800000"/>
+                <a:headEnd/>
+                <a:tailEnd/>
+              </a14:hiddenLine>
+            </a:ext>
+          </a:extLst>
+        </p:spPr>
+      </p:pic>
+      <p:pic>
+        <p:nvPicPr>
+          <p:cNvPr id="92" name="Picture 5"/>
+          <p:cNvPicPr>
+            <a:picLocks noChangeAspect="1"/>
+          </p:cNvPicPr>
+          <p:nvPr/>
+        </p:nvPicPr>
+        <p:blipFill>
+          <a:blip r:embed="rId10">
+            <a:extLst>
+              <a:ext uri="{28A0092B-C50C-407E-A947-70E740481C1C}">
+                <a14:useLocalDpi xmlns:a14="http://schemas.microsoft.com/office/drawing/2010/main" val="0"/>
+              </a:ext>
+            </a:extLst>
+          </a:blip>
+          <a:srcRect/>
+          <a:stretch>
+            <a:fillRect/>
+          </a:stretch>
+        </p:blipFill>
+        <p:spPr bwMode="auto">
+          <a:xfrm>
+            <a:off x="5303837" y="3313226"/>
+            <a:ext cx="604837" cy="528638"/>
+          </a:xfrm>
+          <a:prstGeom prst="rect">
+            <a:avLst/>
+          </a:prstGeom>
+          <a:noFill/>
+          <a:ln>
+            <a:noFill/>
+          </a:ln>
+          <a:extLst>
+            <a:ext uri="{909E8E84-426E-40DD-AFC4-6F175D3DCCD1}">
+              <a14:hiddenFill xmlns:a14="http://schemas.microsoft.com/office/drawing/2010/main">
+                <a:solidFill>
+                  <a:srgbClr val="FFFFFF"/>
+                </a:solidFill>
+              </a14:hiddenFill>
+            </a:ext>
+            <a:ext uri="{91240B29-F687-4F45-9708-019B960494DF}">
+              <a14:hiddenLine xmlns:a14="http://schemas.microsoft.com/office/drawing/2010/main" w="9525">
+                <a:solidFill>
+                  <a:srgbClr val="000000"/>
+                </a:solidFill>
+                <a:miter lim="800000"/>
+                <a:headEnd/>
+                <a:tailEnd/>
+              </a14:hiddenLine>
+            </a:ext>
+          </a:extLst>
+        </p:spPr>
+      </p:pic>
+      <p:pic>
+        <p:nvPicPr>
+          <p:cNvPr id="93" name="Picture 13"/>
+          <p:cNvPicPr>
+            <a:picLocks noChangeAspect="1"/>
+          </p:cNvPicPr>
+          <p:nvPr/>
+        </p:nvPicPr>
+        <p:blipFill>
+          <a:blip r:embed="rId11">
+            <a:extLst>
+              <a:ext uri="{28A0092B-C50C-407E-A947-70E740481C1C}">
+                <a14:useLocalDpi xmlns:a14="http://schemas.microsoft.com/office/drawing/2010/main" val="0"/>
+              </a:ext>
+            </a:extLst>
+          </a:blip>
+          <a:srcRect/>
+          <a:stretch>
+            <a:fillRect/>
+          </a:stretch>
+        </p:blipFill>
+        <p:spPr bwMode="auto">
+          <a:xfrm>
+            <a:off x="1798637" y="5097462"/>
+            <a:ext cx="520700" cy="515937"/>
+          </a:xfrm>
+          <a:prstGeom prst="rect">
+            <a:avLst/>
+          </a:prstGeom>
+          <a:noFill/>
+          <a:ln>
+            <a:noFill/>
+          </a:ln>
+          <a:extLst>
+            <a:ext uri="{909E8E84-426E-40DD-AFC4-6F175D3DCCD1}">
+              <a14:hiddenFill xmlns:a14="http://schemas.microsoft.com/office/drawing/2010/main">
+                <a:solidFill>
+                  <a:srgbClr val="FFFFFF"/>
+                </a:solidFill>
+              </a14:hiddenFill>
+            </a:ext>
+            <a:ext uri="{91240B29-F687-4F45-9708-019B960494DF}">
+              <a14:hiddenLine xmlns:a14="http://schemas.microsoft.com/office/drawing/2010/main" w="9525">
+                <a:solidFill>
+                  <a:srgbClr val="000000"/>
+                </a:solidFill>
+                <a:miter lim="800000"/>
+                <a:headEnd/>
+                <a:tailEnd/>
+              </a14:hiddenLine>
+            </a:ext>
+          </a:extLst>
+        </p:spPr>
+      </p:pic>
+      <p:sp>
+        <p:nvSpPr>
+          <p:cNvPr id="94" name="TextBox 93"/>
+          <p:cNvSpPr txBox="1"/>
+          <p:nvPr/>
+        </p:nvSpPr>
+        <p:spPr>
+          <a:xfrm>
+            <a:off x="5330851" y="2666215"/>
+            <a:ext cx="1877986" cy="646331"/>
+          </a:xfrm>
+          <a:prstGeom prst="rect">
+            <a:avLst/>
+          </a:prstGeom>
+          <a:noFill/>
+        </p:spPr>
+        <p:txBody>
+          <a:bodyPr wrap="square" rtlCol="0">
+            <a:spAutoFit/>
           </a:bodyPr>
           <a:lstStyle/>
           <a:p>
-            <a:r>
-              <a:rPr lang="en-US" dirty="0"/>
-              <a:t>HOL 3: Identity with Azure AD and Office 365 APIs</a:t>
+            <a:pPr marL="0" marR="0" lvl="0" indent="0" defTabSz="914400" eaLnBrk="1" fontAlgn="auto" latinLnBrk="0" hangingPunct="1">
+              <a:lnSpc>
+                <a:spcPct val="100000"/>
+              </a:lnSpc>
+              <a:spcBef>
+                <a:spcPts val="0"/>
+              </a:spcBef>
+              <a:spcAft>
+                <a:spcPts val="0"/>
+              </a:spcAft>
+              <a:buClrTx/>
+              <a:buSzTx/>
+              <a:buFontTx/>
+              <a:buNone/>
+              <a:tabLst/>
+              <a:defRPr/>
+            </a:pPr>
+            <a:r>
+              <a:rPr kumimoji="0" lang="en-US" sz="1800" b="0" i="0" u="none" strike="noStrike" kern="0" cap="none" spc="0" normalizeH="0" baseline="0" noProof="0" dirty="0">
+                <a:ln>
+                  <a:noFill/>
+                </a:ln>
+                <a:solidFill>
+                  <a:schemeClr val="accent1"/>
+                </a:solidFill>
+                <a:effectLst/>
+                <a:uLnTx/>
+                <a:uFillTx/>
+                <a:latin typeface="Segoe UI Semibold" panose="020B0702040204020203" pitchFamily="34" charset="0"/>
+                <a:cs typeface="Segoe UI" panose="020B0502040204020203" pitchFamily="34" charset="0"/>
+              </a:rPr>
+              <a:t>AZURE BLOB</a:t>
+            </a:r>
+            <a:r>
+              <a:rPr kumimoji="0" lang="en-US" sz="1800" b="0" i="0" u="none" strike="noStrike" kern="0" cap="none" spc="0" normalizeH="0" noProof="0" dirty="0">
+                <a:ln>
+                  <a:noFill/>
+                </a:ln>
+                <a:solidFill>
+                  <a:schemeClr val="accent1"/>
+                </a:solidFill>
+                <a:effectLst/>
+                <a:uLnTx/>
+                <a:uFillTx/>
+                <a:latin typeface="Segoe UI Semibold" panose="020B0702040204020203" pitchFamily="34" charset="0"/>
+                <a:cs typeface="Segoe UI" panose="020B0502040204020203" pitchFamily="34" charset="0"/>
+              </a:rPr>
+              <a:t> STORAGE</a:t>
+            </a:r>
+            <a:endParaRPr kumimoji="0" lang="en-US" sz="1800" b="0" i="0" u="none" strike="noStrike" kern="0" cap="none" spc="0" normalizeH="0" baseline="0" noProof="0" dirty="0">
+              <a:ln>
+                <a:noFill/>
+              </a:ln>
+              <a:solidFill>
+                <a:schemeClr val="accent1"/>
+              </a:solidFill>
+              <a:effectLst/>
+              <a:uLnTx/>
+              <a:uFillTx/>
+              <a:latin typeface="Segoe UI Semibold" panose="020B0702040204020203" pitchFamily="34" charset="0"/>
+              <a:cs typeface="Segoe UI" panose="020B0502040204020203" pitchFamily="34" charset="0"/>
+            </a:endParaRPr>
+          </a:p>
+        </p:txBody>
+      </p:sp>
+      <p:sp>
+        <p:nvSpPr>
+          <p:cNvPr id="95" name="Oval 94"/>
+          <p:cNvSpPr/>
+          <p:nvPr/>
+        </p:nvSpPr>
+        <p:spPr>
+          <a:xfrm>
+            <a:off x="4881150" y="2776316"/>
+            <a:ext cx="444097" cy="426129"/>
+          </a:xfrm>
+          <a:prstGeom prst="ellipse">
+            <a:avLst/>
+          </a:prstGeom>
+          <a:solidFill>
+            <a:schemeClr val="tx2"/>
+          </a:solidFill>
+          <a:ln w="25400">
+            <a:noFill/>
+          </a:ln>
+        </p:spPr>
+        <p:style>
+          <a:lnRef idx="2">
+            <a:schemeClr val="accent1">
+              <a:shade val="50000"/>
+            </a:schemeClr>
+          </a:lnRef>
+          <a:fillRef idx="1">
+            <a:schemeClr val="accent1"/>
+          </a:fillRef>
+          <a:effectRef idx="0">
+            <a:schemeClr val="accent1"/>
+          </a:effectRef>
+          <a:fontRef idx="minor">
+            <a:schemeClr val="lt1"/>
+          </a:fontRef>
+        </p:style>
+        <p:txBody>
+          <a:bodyPr rtlCol="0" anchor="ctr"/>
+          <a:lstStyle/>
+          <a:p>
+            <a:pPr marL="0" marR="0" lvl="0" indent="0" algn="ctr" defTabSz="914400" eaLnBrk="1" fontAlgn="auto" latinLnBrk="0" hangingPunct="1">
+              <a:lnSpc>
+                <a:spcPct val="100000"/>
+              </a:lnSpc>
+              <a:spcBef>
+                <a:spcPts val="0"/>
+              </a:spcBef>
+              <a:spcAft>
+                <a:spcPts val="0"/>
+              </a:spcAft>
+              <a:buClrTx/>
+              <a:buSzTx/>
+              <a:buFontTx/>
+              <a:buNone/>
+              <a:tabLst/>
+              <a:defRPr/>
+            </a:pPr>
+            <a:r>
+              <a:rPr kumimoji="0" lang="en-US" sz="2000" b="0" i="0" u="none" strike="noStrike" kern="0" cap="none" spc="0" normalizeH="0" baseline="0" noProof="0" dirty="0">
+                <a:ln>
+                  <a:noFill/>
+                </a:ln>
+                <a:solidFill>
+                  <a:schemeClr val="bg1"/>
+                </a:solidFill>
+                <a:effectLst/>
+                <a:uLnTx/>
+                <a:uFillTx/>
+                <a:latin typeface="Segoe UI Semibold" panose="020B0702040204020203" pitchFamily="34" charset="0"/>
+              </a:rPr>
+              <a:t>3</a:t>
+            </a:r>
+          </a:p>
+        </p:txBody>
+      </p:sp>
+      <p:sp>
+        <p:nvSpPr>
+          <p:cNvPr id="96" name="TextBox 95"/>
+          <p:cNvSpPr txBox="1"/>
+          <p:nvPr/>
+        </p:nvSpPr>
+        <p:spPr>
+          <a:xfrm>
+            <a:off x="6461106" y="4375206"/>
+            <a:ext cx="1509731" cy="646331"/>
+          </a:xfrm>
+          <a:prstGeom prst="rect">
+            <a:avLst/>
+          </a:prstGeom>
+          <a:noFill/>
+        </p:spPr>
+        <p:txBody>
+          <a:bodyPr wrap="square" rtlCol="0">
+            <a:spAutoFit/>
+          </a:bodyPr>
+          <a:lstStyle/>
+          <a:p>
+            <a:pPr marL="0" marR="0" lvl="0" indent="0" defTabSz="914400" eaLnBrk="1" fontAlgn="auto" latinLnBrk="0" hangingPunct="1">
+              <a:lnSpc>
+                <a:spcPct val="100000"/>
+              </a:lnSpc>
+              <a:spcBef>
+                <a:spcPts val="0"/>
+              </a:spcBef>
+              <a:spcAft>
+                <a:spcPts val="0"/>
+              </a:spcAft>
+              <a:buClrTx/>
+              <a:buSzTx/>
+              <a:buFontTx/>
+              <a:buNone/>
+              <a:tabLst/>
+              <a:defRPr/>
+            </a:pPr>
+            <a:r>
+              <a:rPr kumimoji="0" lang="en-US" sz="1800" b="0" i="0" u="none" strike="noStrike" kern="0" cap="none" spc="0" normalizeH="0" baseline="0" noProof="0" dirty="0">
+                <a:ln>
+                  <a:noFill/>
+                </a:ln>
+                <a:solidFill>
+                  <a:schemeClr val="accent1"/>
+                </a:solidFill>
+                <a:effectLst/>
+                <a:uLnTx/>
+                <a:uFillTx/>
+                <a:latin typeface="Segoe UI Semibold" panose="020B0702040204020203" pitchFamily="34" charset="0"/>
+                <a:cs typeface="Segoe UI" panose="020B0502040204020203" pitchFamily="34" charset="0"/>
+              </a:rPr>
+              <a:t>AZURE CACHE</a:t>
+            </a:r>
+          </a:p>
+        </p:txBody>
+      </p:sp>
+      <p:sp>
+        <p:nvSpPr>
+          <p:cNvPr id="97" name="Oval 96"/>
+          <p:cNvSpPr/>
+          <p:nvPr/>
+        </p:nvSpPr>
+        <p:spPr>
+          <a:xfrm>
+            <a:off x="6011405" y="4485307"/>
+            <a:ext cx="444097" cy="426129"/>
+          </a:xfrm>
+          <a:prstGeom prst="ellipse">
+            <a:avLst/>
+          </a:prstGeom>
+          <a:solidFill>
+            <a:schemeClr val="tx2"/>
+          </a:solidFill>
+          <a:ln w="25400">
+            <a:noFill/>
+          </a:ln>
+        </p:spPr>
+        <p:style>
+          <a:lnRef idx="2">
+            <a:schemeClr val="accent1">
+              <a:shade val="50000"/>
+            </a:schemeClr>
+          </a:lnRef>
+          <a:fillRef idx="1">
+            <a:schemeClr val="accent1"/>
+          </a:fillRef>
+          <a:effectRef idx="0">
+            <a:schemeClr val="accent1"/>
+          </a:effectRef>
+          <a:fontRef idx="minor">
+            <a:schemeClr val="lt1"/>
+          </a:fontRef>
+        </p:style>
+        <p:txBody>
+          <a:bodyPr rtlCol="0" anchor="ctr"/>
+          <a:lstStyle/>
+          <a:p>
+            <a:pPr marL="0" marR="0" lvl="0" indent="0" algn="ctr" defTabSz="914400" eaLnBrk="1" fontAlgn="auto" latinLnBrk="0" hangingPunct="1">
+              <a:lnSpc>
+                <a:spcPct val="100000"/>
+              </a:lnSpc>
+              <a:spcBef>
+                <a:spcPts val="0"/>
+              </a:spcBef>
+              <a:spcAft>
+                <a:spcPts val="0"/>
+              </a:spcAft>
+              <a:buClrTx/>
+              <a:buSzTx/>
+              <a:buFontTx/>
+              <a:buNone/>
+              <a:tabLst/>
+              <a:defRPr/>
+            </a:pPr>
+            <a:r>
+              <a:rPr kumimoji="0" lang="en-US" sz="2000" b="0" i="0" u="none" strike="noStrike" kern="0" cap="none" spc="0" normalizeH="0" baseline="0" noProof="0" dirty="0">
+                <a:ln>
+                  <a:noFill/>
+                </a:ln>
+                <a:solidFill>
+                  <a:schemeClr val="bg1"/>
+                </a:solidFill>
+                <a:effectLst/>
+                <a:uLnTx/>
+                <a:uFillTx/>
+                <a:latin typeface="Segoe UI Semibold" panose="020B0702040204020203" pitchFamily="34" charset="0"/>
+              </a:rPr>
+              <a:t>3</a:t>
+            </a:r>
+          </a:p>
+        </p:txBody>
+      </p:sp>
+      <p:sp>
+        <p:nvSpPr>
+          <p:cNvPr id="98" name="TextBox 97"/>
+          <p:cNvSpPr txBox="1"/>
+          <p:nvPr/>
+        </p:nvSpPr>
+        <p:spPr>
+          <a:xfrm>
+            <a:off x="3568456" y="4451131"/>
+            <a:ext cx="1495461" cy="369332"/>
+          </a:xfrm>
+          <a:prstGeom prst="rect">
+            <a:avLst/>
+          </a:prstGeom>
+          <a:noFill/>
+        </p:spPr>
+        <p:txBody>
+          <a:bodyPr wrap="square" rtlCol="0">
+            <a:spAutoFit/>
+          </a:bodyPr>
+          <a:lstStyle/>
+          <a:p>
+            <a:pPr marL="0" marR="0" lvl="0" indent="0" defTabSz="914400" eaLnBrk="1" fontAlgn="auto" latinLnBrk="0" hangingPunct="1">
+              <a:lnSpc>
+                <a:spcPct val="100000"/>
+              </a:lnSpc>
+              <a:spcBef>
+                <a:spcPts val="0"/>
+              </a:spcBef>
+              <a:spcAft>
+                <a:spcPts val="0"/>
+              </a:spcAft>
+              <a:buClrTx/>
+              <a:buSzTx/>
+              <a:buFontTx/>
+              <a:buNone/>
+              <a:tabLst/>
+              <a:defRPr/>
+            </a:pPr>
+            <a:r>
+              <a:rPr kumimoji="0" lang="en-US" sz="1800" b="0" i="0" u="none" strike="noStrike" kern="0" cap="none" spc="0" normalizeH="0" baseline="0" noProof="0" dirty="0">
+                <a:ln>
+                  <a:noFill/>
+                </a:ln>
+                <a:solidFill>
+                  <a:schemeClr val="accent1"/>
+                </a:solidFill>
+                <a:effectLst/>
+                <a:uLnTx/>
+                <a:uFillTx/>
+                <a:latin typeface="Segoe UI Semibold" panose="020B0702040204020203" pitchFamily="34" charset="0"/>
+                <a:cs typeface="Segoe UI" panose="020B0502040204020203" pitchFamily="34" charset="0"/>
+              </a:rPr>
+              <a:t>AZURE AD</a:t>
+            </a:r>
+          </a:p>
+        </p:txBody>
+      </p:sp>
+      <p:sp>
+        <p:nvSpPr>
+          <p:cNvPr id="99" name="Oval 98"/>
+          <p:cNvSpPr/>
+          <p:nvPr/>
+        </p:nvSpPr>
+        <p:spPr>
+          <a:xfrm>
+            <a:off x="3118755" y="4561232"/>
+            <a:ext cx="444097" cy="426129"/>
+          </a:xfrm>
+          <a:prstGeom prst="ellipse">
+            <a:avLst/>
+          </a:prstGeom>
+          <a:solidFill>
+            <a:schemeClr val="tx2"/>
+          </a:solidFill>
+          <a:ln w="25400">
+            <a:noFill/>
+          </a:ln>
+        </p:spPr>
+        <p:style>
+          <a:lnRef idx="2">
+            <a:schemeClr val="accent1">
+              <a:shade val="50000"/>
+            </a:schemeClr>
+          </a:lnRef>
+          <a:fillRef idx="1">
+            <a:schemeClr val="accent1"/>
+          </a:fillRef>
+          <a:effectRef idx="0">
+            <a:schemeClr val="accent1"/>
+          </a:effectRef>
+          <a:fontRef idx="minor">
+            <a:schemeClr val="lt1"/>
+          </a:fontRef>
+        </p:style>
+        <p:txBody>
+          <a:bodyPr rtlCol="0" anchor="ctr"/>
+          <a:lstStyle/>
+          <a:p>
+            <a:pPr marL="0" marR="0" lvl="0" indent="0" algn="ctr" defTabSz="914400" eaLnBrk="1" fontAlgn="auto" latinLnBrk="0" hangingPunct="1">
+              <a:lnSpc>
+                <a:spcPct val="100000"/>
+              </a:lnSpc>
+              <a:spcBef>
+                <a:spcPts val="0"/>
+              </a:spcBef>
+              <a:spcAft>
+                <a:spcPts val="0"/>
+              </a:spcAft>
+              <a:buClrTx/>
+              <a:buSzTx/>
+              <a:buFontTx/>
+              <a:buNone/>
+              <a:tabLst/>
+              <a:defRPr/>
+            </a:pPr>
+            <a:r>
+              <a:rPr kumimoji="0" lang="en-US" sz="2000" b="0" i="0" u="none" strike="noStrike" kern="0" cap="none" spc="0" normalizeH="0" baseline="0" noProof="0" dirty="0">
+                <a:ln>
+                  <a:noFill/>
+                </a:ln>
+                <a:solidFill>
+                  <a:schemeClr val="bg1"/>
+                </a:solidFill>
+                <a:effectLst/>
+                <a:uLnTx/>
+                <a:uFillTx/>
+                <a:latin typeface="Segoe UI Semibold" panose="020B0702040204020203" pitchFamily="34" charset="0"/>
+              </a:rPr>
+              <a:t>3</a:t>
+            </a:r>
+          </a:p>
+        </p:txBody>
+      </p:sp>
+      <p:sp>
+        <p:nvSpPr>
+          <p:cNvPr id="100" name="TextBox 99"/>
+          <p:cNvSpPr txBox="1"/>
+          <p:nvPr/>
+        </p:nvSpPr>
+        <p:spPr>
+          <a:xfrm>
+            <a:off x="1672430" y="4433533"/>
+            <a:ext cx="1495461" cy="369332"/>
+          </a:xfrm>
+          <a:prstGeom prst="rect">
+            <a:avLst/>
+          </a:prstGeom>
+          <a:noFill/>
+        </p:spPr>
+        <p:txBody>
+          <a:bodyPr wrap="square" rtlCol="0">
+            <a:spAutoFit/>
+          </a:bodyPr>
+          <a:lstStyle/>
+          <a:p>
+            <a:pPr marL="0" marR="0" lvl="0" indent="0" defTabSz="914400" eaLnBrk="1" fontAlgn="auto" latinLnBrk="0" hangingPunct="1">
+              <a:lnSpc>
+                <a:spcPct val="100000"/>
+              </a:lnSpc>
+              <a:spcBef>
+                <a:spcPts val="0"/>
+              </a:spcBef>
+              <a:spcAft>
+                <a:spcPts val="0"/>
+              </a:spcAft>
+              <a:buClrTx/>
+              <a:buSzTx/>
+              <a:buFontTx/>
+              <a:buNone/>
+              <a:tabLst/>
+              <a:defRPr/>
+            </a:pPr>
+            <a:r>
+              <a:rPr kumimoji="0" lang="en-US" sz="1800" b="0" i="0" u="none" strike="noStrike" kern="0" cap="none" spc="0" normalizeH="0" baseline="0" noProof="0" dirty="0">
+                <a:ln>
+                  <a:noFill/>
+                </a:ln>
+                <a:solidFill>
+                  <a:schemeClr val="accent1"/>
+                </a:solidFill>
+                <a:effectLst/>
+                <a:uLnTx/>
+                <a:uFillTx/>
+                <a:latin typeface="Segoe UI Semibold" panose="020B0702040204020203" pitchFamily="34" charset="0"/>
+                <a:cs typeface="Segoe UI" panose="020B0502040204020203" pitchFamily="34" charset="0"/>
+              </a:rPr>
+              <a:t>VSTS</a:t>
+            </a:r>
+          </a:p>
+        </p:txBody>
+      </p:sp>
+      <p:sp>
+        <p:nvSpPr>
+          <p:cNvPr id="101" name="Oval 100"/>
+          <p:cNvSpPr/>
+          <p:nvPr/>
+        </p:nvSpPr>
+        <p:spPr>
+          <a:xfrm>
+            <a:off x="1222729" y="4543634"/>
+            <a:ext cx="444097" cy="426129"/>
+          </a:xfrm>
+          <a:prstGeom prst="ellipse">
+            <a:avLst/>
+          </a:prstGeom>
+          <a:solidFill>
+            <a:schemeClr val="tx2"/>
+          </a:solidFill>
+          <a:ln w="25400">
+            <a:noFill/>
+          </a:ln>
+        </p:spPr>
+        <p:style>
+          <a:lnRef idx="2">
+            <a:schemeClr val="accent1">
+              <a:shade val="50000"/>
+            </a:schemeClr>
+          </a:lnRef>
+          <a:fillRef idx="1">
+            <a:schemeClr val="accent1"/>
+          </a:fillRef>
+          <a:effectRef idx="0">
+            <a:schemeClr val="accent1"/>
+          </a:effectRef>
+          <a:fontRef idx="minor">
+            <a:schemeClr val="lt1"/>
+          </a:fontRef>
+        </p:style>
+        <p:txBody>
+          <a:bodyPr rtlCol="0" anchor="ctr"/>
+          <a:lstStyle/>
+          <a:p>
+            <a:pPr marL="0" marR="0" lvl="0" indent="0" algn="ctr" defTabSz="914400" eaLnBrk="1" fontAlgn="auto" latinLnBrk="0" hangingPunct="1">
+              <a:lnSpc>
+                <a:spcPct val="100000"/>
+              </a:lnSpc>
+              <a:spcBef>
+                <a:spcPts val="0"/>
+              </a:spcBef>
+              <a:spcAft>
+                <a:spcPts val="0"/>
+              </a:spcAft>
+              <a:buClrTx/>
+              <a:buSzTx/>
+              <a:buFontTx/>
+              <a:buNone/>
+              <a:tabLst/>
+              <a:defRPr/>
+            </a:pPr>
+            <a:r>
+              <a:rPr kumimoji="0" lang="en-US" sz="2000" b="0" i="0" u="none" strike="noStrike" kern="0" cap="none" spc="0" normalizeH="0" baseline="0" noProof="0" dirty="0">
+                <a:ln>
+                  <a:noFill/>
+                </a:ln>
+                <a:solidFill>
+                  <a:schemeClr val="bg1"/>
+                </a:solidFill>
+                <a:effectLst/>
+                <a:uLnTx/>
+                <a:uFillTx/>
+                <a:latin typeface="Segoe UI Semibold" panose="020B0702040204020203" pitchFamily="34" charset="0"/>
+              </a:rPr>
+              <a:t>3</a:t>
             </a:r>
           </a:p>
         </p:txBody>
       </p:sp>
     </p:spTree>
+    <p:custDataLst>
+      <p:tags r:id="rId1"/>
+    </p:custDataLst>
     <p:extLst>
       <p:ext uri="{BB962C8B-B14F-4D97-AF65-F5344CB8AC3E}">
-        <p14:creationId xmlns:p14="http://schemas.microsoft.com/office/powerpoint/2010/main" val="2890623480"/>
+        <p14:creationId xmlns:p14="http://schemas.microsoft.com/office/powerpoint/2010/main" val="2800457793"/>
       </p:ext>
     </p:extLst>
   </p:cSld>
@@ -14233,6 +16313,142 @@
   <p:transition>
     <p:fade/>
   </p:transition>
+  <p:timing>
+    <p:tnLst>
+      <p:par>
+        <p:cTn id="1" dur="indefinite" restart="never" nodeType="tmRoot">
+          <p:childTnLst>
+            <p:seq concurrent="1" nextAc="seek">
+              <p:cTn id="2" dur="indefinite" nodeType="mainSeq">
+                <p:childTnLst>
+                  <p:par>
+                    <p:cTn id="3" fill="hold">
+                      <p:stCondLst>
+                        <p:cond delay="indefinite"/>
+                      </p:stCondLst>
+                      <p:childTnLst>
+                        <p:par>
+                          <p:cTn id="4" fill="hold">
+                            <p:stCondLst>
+                              <p:cond delay="0"/>
+                            </p:stCondLst>
+                            <p:childTnLst>
+                              <p:par>
+                                <p:cTn id="5" presetID="22" presetClass="entr" presetSubtype="1" fill="hold" nodeType="clickEffect">
+                                  <p:stCondLst>
+                                    <p:cond delay="0"/>
+                                  </p:stCondLst>
+                                  <p:childTnLst>
+                                    <p:set>
+                                      <p:cBhvr>
+                                        <p:cTn id="6" dur="1" fill="hold">
+                                          <p:stCondLst>
+                                            <p:cond delay="0"/>
+                                          </p:stCondLst>
+                                        </p:cTn>
+                                        <p:tgtEl>
+                                          <p:spTgt spid="30"/>
+                                        </p:tgtEl>
+                                        <p:attrNameLst>
+                                          <p:attrName>style.visibility</p:attrName>
+                                        </p:attrNameLst>
+                                      </p:cBhvr>
+                                      <p:to>
+                                        <p:strVal val="visible"/>
+                                      </p:to>
+                                    </p:set>
+                                    <p:animEffect transition="in" filter="wipe(up)">
+                                      <p:cBhvr>
+                                        <p:cTn id="7" dur="750"/>
+                                        <p:tgtEl>
+                                          <p:spTgt spid="30"/>
+                                        </p:tgtEl>
+                                      </p:cBhvr>
+                                    </p:animEffect>
+                                  </p:childTnLst>
+                                </p:cTn>
+                              </p:par>
+                            </p:childTnLst>
+                          </p:cTn>
+                        </p:par>
+                      </p:childTnLst>
+                    </p:cTn>
+                  </p:par>
+                  <p:par>
+                    <p:cTn id="8" fill="hold">
+                      <p:stCondLst>
+                        <p:cond delay="indefinite"/>
+                      </p:stCondLst>
+                      <p:childTnLst>
+                        <p:par>
+                          <p:cTn id="9" fill="hold">
+                            <p:stCondLst>
+                              <p:cond delay="0"/>
+                            </p:stCondLst>
+                            <p:childTnLst>
+                              <p:par>
+                                <p:cTn id="10" presetID="22" presetClass="entr" presetSubtype="8" fill="hold" nodeType="clickEffect">
+                                  <p:stCondLst>
+                                    <p:cond delay="0"/>
+                                  </p:stCondLst>
+                                  <p:childTnLst>
+                                    <p:set>
+                                      <p:cBhvr>
+                                        <p:cTn id="11" dur="1" fill="hold">
+                                          <p:stCondLst>
+                                            <p:cond delay="0"/>
+                                          </p:stCondLst>
+                                        </p:cTn>
+                                        <p:tgtEl>
+                                          <p:spTgt spid="34"/>
+                                        </p:tgtEl>
+                                        <p:attrNameLst>
+                                          <p:attrName>style.visibility</p:attrName>
+                                        </p:attrNameLst>
+                                      </p:cBhvr>
+                                      <p:to>
+                                        <p:strVal val="visible"/>
+                                      </p:to>
+                                    </p:set>
+                                    <p:animEffect transition="in" filter="wipe(left)">
+                                      <p:cBhvr>
+                                        <p:cTn id="12" dur="750"/>
+                                        <p:tgtEl>
+                                          <p:spTgt spid="34"/>
+                                        </p:tgtEl>
+                                      </p:cBhvr>
+                                    </p:animEffect>
+                                  </p:childTnLst>
+                                </p:cTn>
+                              </p:par>
+                            </p:childTnLst>
+                          </p:cTn>
+                        </p:par>
+                      </p:childTnLst>
+                    </p:cTn>
+                  </p:par>
+                </p:childTnLst>
+              </p:cTn>
+              <p:prevCondLst>
+                <p:cond evt="onPrev" delay="0">
+                  <p:tgtEl>
+                    <p:sldTgt/>
+                  </p:tgtEl>
+                </p:cond>
+              </p:prevCondLst>
+              <p:nextCondLst>
+                <p:cond evt="onNext" delay="0">
+                  <p:tgtEl>
+                    <p:sldTgt/>
+                  </p:tgtEl>
+                </p:cond>
+              </p:nextCondLst>
+            </p:seq>
+          </p:childTnLst>
+        </p:cTn>
+      </p:par>
+    </p:tnLst>
+  </p:timing>
 </p:sld>
 </file>
 
@@ -14255,7 +16471,7 @@
       </p:grpSpPr>
       <p:sp>
         <p:nvSpPr>
-          <p:cNvPr id="3" name="Text Placeholder 2"/>
+          <p:cNvPr id="2" name="Text Placeholder 1"/>
           <p:cNvSpPr>
             <a:spLocks noGrp="1"/>
           </p:cNvSpPr>
@@ -14270,37 +16486,31 @@
           <a:p>
             <a:r>
               <a:rPr lang="en-US"/>
-              <a:t>Create VSTS Tenant</a:t>
+              <a:t>Connect Azure subscription (Pass or Trial)</a:t>
             </a:r>
           </a:p>
           <a:p>
             <a:r>
               <a:rPr lang="en-US"/>
-              <a:t>Create Git repository</a:t>
+              <a:t>Create O365 Developer Tenant</a:t>
             </a:r>
           </a:p>
           <a:p>
             <a:r>
               <a:rPr lang="en-US"/>
-              <a:t>Clone git repo locally</a:t>
+              <a:t>Create Visual Studio online account</a:t>
             </a:r>
           </a:p>
           <a:p>
             <a:r>
               <a:rPr lang="en-US"/>
-              <a:t>Push code into VSTS</a:t>
+              <a:t>Take prepared image, walk through the tools that are available</a:t>
             </a:r>
           </a:p>
           <a:p>
             <a:r>
               <a:rPr lang="en-US"/>
-              <a:t>Create CI pipeline to build</a:t>
-            </a:r>
-          </a:p>
-          <a:p>
-            <a:r>
-              <a:rPr lang="en-US"/>
-              <a:t>Ends with published artifacts</a:t>
+              <a:t>Run ARM Template to scaffold out resources</a:t>
             </a:r>
             <a:endParaRPr lang="en-US" dirty="0"/>
           </a:p>
@@ -14308,7 +16518,7 @@
       </p:sp>
       <p:sp>
         <p:nvSpPr>
-          <p:cNvPr id="2" name="Title 1"/>
+          <p:cNvPr id="3" name="Title 2"/>
           <p:cNvSpPr>
             <a:spLocks noGrp="1"/>
           </p:cNvSpPr>
@@ -14323,7 +16533,7 @@
           <a:p>
             <a:r>
               <a:rPr lang="en-US"/>
-              <a:t>HOL 4: DevOps with Azure and VSTS</a:t>
+              <a:t>HOL 1: Setting up your developer environment</a:t>
             </a:r>
             <a:endParaRPr lang="en-US" dirty="0"/>
           </a:p>
@@ -14332,7 +16542,7 @@
     </p:spTree>
     <p:extLst>
       <p:ext uri="{BB962C8B-B14F-4D97-AF65-F5344CB8AC3E}">
-        <p14:creationId xmlns:p14="http://schemas.microsoft.com/office/powerpoint/2010/main" val="3481618648"/>
+        <p14:creationId xmlns:p14="http://schemas.microsoft.com/office/powerpoint/2010/main" val="4222031049"/>
       </p:ext>
     </p:extLst>
   </p:cSld>
@@ -14378,30 +16588,53 @@
           <a:lstStyle/>
           <a:p>
             <a:r>
-              <a:rPr lang="en-US"/>
-              <a:t>Create ARM template for web app in VS</a:t>
-            </a:r>
-          </a:p>
-          <a:p>
-            <a:r>
-              <a:rPr lang="en-US"/>
-              <a:t>Deploy using VSTS</a:t>
-            </a:r>
-          </a:p>
-          <a:p>
-            <a:r>
-              <a:rPr lang="en-US"/>
-              <a:t>Create 3 environments</a:t>
-            </a:r>
-          </a:p>
-          <a:p>
-            <a:r>
-              <a:rPr lang="en-US"/>
-              <a:t>Configure CD</a:t>
-            </a:r>
-          </a:p>
-          <a:p>
-            <a:endParaRPr lang="en-US" dirty="0"/>
+              <a:rPr lang="en-US" dirty="0"/>
+              <a:t>Starting with provisioned resource group</a:t>
+            </a:r>
+          </a:p>
+          <a:p>
+            <a:r>
+              <a:rPr lang="en-US" dirty="0"/>
+              <a:t>Select front end app (Node.js /.NET/ Java)</a:t>
+            </a:r>
+          </a:p>
+          <a:p>
+            <a:r>
+              <a:rPr lang="en-US" dirty="0"/>
+              <a:t>Connect to deployed API</a:t>
+            </a:r>
+          </a:p>
+          <a:p>
+            <a:r>
+              <a:rPr lang="en-US" dirty="0"/>
+              <a:t>Add blob storage</a:t>
+            </a:r>
+          </a:p>
+          <a:p>
+            <a:r>
+              <a:rPr lang="en-US" dirty="0"/>
+              <a:t>Add queueing</a:t>
+            </a:r>
+          </a:p>
+          <a:p>
+            <a:r>
+              <a:rPr lang="en-US" dirty="0"/>
+              <a:t>Add </a:t>
+            </a:r>
+            <a:r>
+              <a:rPr lang="en-US" dirty="0" err="1"/>
+              <a:t>Redis</a:t>
+            </a:r>
+            <a:r>
+              <a:rPr lang="en-US" dirty="0"/>
+              <a:t> cache</a:t>
+            </a:r>
+          </a:p>
+          <a:p>
+            <a:r>
+              <a:rPr lang="en-US" dirty="0"/>
+              <a:t>Stretch: Image resizing with Function</a:t>
+            </a:r>
           </a:p>
         </p:txBody>
       </p:sp>
@@ -14422,7 +16655,7 @@
           <a:p>
             <a:r>
               <a:rPr lang="en-US"/>
-              <a:t>HOL 5: Infrastructure as code with (ARM)</a:t>
+              <a:t>HOL 2: Building modern cloud apps</a:t>
             </a:r>
             <a:endParaRPr lang="en-US" dirty="0"/>
           </a:p>
@@ -14431,7 +16664,7 @@
     </p:spTree>
     <p:extLst>
       <p:ext uri="{BB962C8B-B14F-4D97-AF65-F5344CB8AC3E}">
-        <p14:creationId xmlns:p14="http://schemas.microsoft.com/office/powerpoint/2010/main" val="3620859700"/>
+        <p14:creationId xmlns:p14="http://schemas.microsoft.com/office/powerpoint/2010/main" val="103508438"/>
       </p:ext>
     </p:extLst>
   </p:cSld>
@@ -14473,56 +16706,63 @@
         </p:nvSpPr>
         <p:spPr/>
         <p:txBody>
-          <a:bodyPr/>
+          <a:bodyPr>
+            <a:normAutofit fontScale="40000" lnSpcReduction="20000"/>
+          </a:bodyPr>
           <a:lstStyle/>
           <a:p>
             <a:r>
-              <a:rPr lang="en-US"/>
-              <a:t>Add App Insights resource to Azure</a:t>
-            </a:r>
-          </a:p>
-          <a:p>
-            <a:r>
-              <a:rPr lang="en-US"/>
-              <a:t>Add App Insights to application</a:t>
-            </a:r>
-          </a:p>
-          <a:p>
-            <a:r>
-              <a:rPr lang="en-US"/>
-              <a:t>Add server side SDK</a:t>
-            </a:r>
-          </a:p>
-          <a:p>
-            <a:r>
-              <a:rPr lang="en-US"/>
-              <a:t>Add client side libraries</a:t>
-            </a:r>
-          </a:p>
-          <a:p>
-            <a:r>
-              <a:rPr lang="en-US"/>
-              <a:t>Create custom events</a:t>
-            </a:r>
-          </a:p>
-          <a:p>
-            <a:r>
-              <a:rPr lang="en-US"/>
-              <a:t>Create custom metric</a:t>
-            </a:r>
-          </a:p>
-          <a:p>
-            <a:r>
-              <a:rPr lang="en-US"/>
-              <a:t>Create availability test</a:t>
-            </a:r>
-          </a:p>
-          <a:p>
-            <a:r>
-              <a:rPr lang="en-US"/>
-              <a:t>View the dashboard</a:t>
-            </a:r>
-            <a:endParaRPr lang="en-US" dirty="0"/>
+              <a:rPr lang="en-US" dirty="0"/>
+              <a:t>Find AD </a:t>
+            </a:r>
+          </a:p>
+          <a:p>
+            <a:r>
+              <a:rPr lang="en-US" dirty="0"/>
+              <a:t>Create AD Application</a:t>
+            </a:r>
+          </a:p>
+          <a:p>
+            <a:r>
+              <a:rPr lang="en-US" dirty="0"/>
+              <a:t>Add authentication to app</a:t>
+            </a:r>
+          </a:p>
+          <a:p>
+            <a:r>
+              <a:rPr lang="en-US" dirty="0"/>
+              <a:t>Authenticate</a:t>
+            </a:r>
+          </a:p>
+          <a:p>
+            <a:r>
+              <a:rPr lang="en-US" dirty="0"/>
+              <a:t>Add profile page</a:t>
+            </a:r>
+          </a:p>
+          <a:p>
+            <a:r>
+              <a:rPr lang="en-US" dirty="0"/>
+              <a:t>Add graph API call to get user data for profile page</a:t>
+            </a:r>
+          </a:p>
+          <a:p>
+            <a:r>
+              <a:rPr lang="en-US" dirty="0"/>
+              <a:t>Populate first &amp; last name of the new incident form with first name &amp; last name from Graph/token</a:t>
+            </a:r>
+          </a:p>
+          <a:p>
+            <a:r>
+              <a:rPr lang="en-US" dirty="0"/>
+              <a:t>Send Email via Graph on new incident creation</a:t>
+            </a:r>
+          </a:p>
+          <a:p>
+            <a:r>
+              <a:rPr lang="en-US" dirty="0"/>
+              <a:t>Stretch: Add calendar event on new incident creation</a:t>
+            </a:r>
           </a:p>
         </p:txBody>
       </p:sp>
@@ -14545,21 +16785,15 @@
           <a:p>
             <a:r>
               <a:rPr lang="en-US" dirty="0"/>
-              <a:t>HOL 6: Monitoring applications with App Insights</a:t>
-            </a:r>
-          </a:p>
-          <a:p>
-            <a:endParaRPr lang="en-US" dirty="0"/>
-          </a:p>
-          <a:p>
-            <a:endParaRPr lang="en-US" dirty="0"/>
+              <a:t>HOL 3: Identity with Azure AD and Office 365 APIs</a:t>
+            </a:r>
           </a:p>
         </p:txBody>
       </p:sp>
     </p:spTree>
     <p:extLst>
       <p:ext uri="{BB962C8B-B14F-4D97-AF65-F5344CB8AC3E}">
-        <p14:creationId xmlns:p14="http://schemas.microsoft.com/office/powerpoint/2010/main" val="2211970092"/>
+        <p14:creationId xmlns:p14="http://schemas.microsoft.com/office/powerpoint/2010/main" val="2890623480"/>
       </p:ext>
     </p:extLst>
   </p:cSld>
@@ -14589,10 +16823,86 @@
           <a:chExt cx="0" cy="0"/>
         </a:xfrm>
       </p:grpSpPr>
+      <p:sp>
+        <p:nvSpPr>
+          <p:cNvPr id="3" name="Text Placeholder 2"/>
+          <p:cNvSpPr>
+            <a:spLocks noGrp="1"/>
+          </p:cNvSpPr>
+          <p:nvPr>
+            <p:ph type="body" sz="quarter" idx="10"/>
+          </p:nvPr>
+        </p:nvSpPr>
+        <p:spPr/>
+        <p:txBody>
+          <a:bodyPr/>
+          <a:lstStyle/>
+          <a:p>
+            <a:r>
+              <a:rPr lang="en-US"/>
+              <a:t>Create VSTS Tenant</a:t>
+            </a:r>
+          </a:p>
+          <a:p>
+            <a:r>
+              <a:rPr lang="en-US"/>
+              <a:t>Create Git repository</a:t>
+            </a:r>
+          </a:p>
+          <a:p>
+            <a:r>
+              <a:rPr lang="en-US"/>
+              <a:t>Clone git repo locally</a:t>
+            </a:r>
+          </a:p>
+          <a:p>
+            <a:r>
+              <a:rPr lang="en-US"/>
+              <a:t>Push code into VSTS</a:t>
+            </a:r>
+          </a:p>
+          <a:p>
+            <a:r>
+              <a:rPr lang="en-US"/>
+              <a:t>Create CI pipeline to build</a:t>
+            </a:r>
+          </a:p>
+          <a:p>
+            <a:r>
+              <a:rPr lang="en-US"/>
+              <a:t>Ends with published artifacts</a:t>
+            </a:r>
+            <a:endParaRPr lang="en-US" dirty="0"/>
+          </a:p>
+        </p:txBody>
+      </p:sp>
+      <p:sp>
+        <p:nvSpPr>
+          <p:cNvPr id="2" name="Title 1"/>
+          <p:cNvSpPr>
+            <a:spLocks noGrp="1"/>
+          </p:cNvSpPr>
+          <p:nvPr>
+            <p:ph type="title"/>
+          </p:nvPr>
+        </p:nvSpPr>
+        <p:spPr/>
+        <p:txBody>
+          <a:bodyPr/>
+          <a:lstStyle/>
+          <a:p>
+            <a:r>
+              <a:rPr lang="en-US"/>
+              <a:t>HOL 4: DevOps with Azure and VSTS</a:t>
+            </a:r>
+            <a:endParaRPr lang="en-US" dirty="0"/>
+          </a:p>
+        </p:txBody>
+      </p:sp>
     </p:spTree>
     <p:extLst>
       <p:ext uri="{BB962C8B-B14F-4D97-AF65-F5344CB8AC3E}">
-        <p14:creationId xmlns:p14="http://schemas.microsoft.com/office/powerpoint/2010/main" val="3813053244"/>
+        <p14:creationId xmlns:p14="http://schemas.microsoft.com/office/powerpoint/2010/main" val="3481618648"/>
       </p:ext>
     </p:extLst>
   </p:cSld>
@@ -14603,6 +16913,18 @@
     <p:fade/>
   </p:transition>
 </p:sld>
+</file>
+
+<file path=ppt/tags/tag1.xml><?xml version="1.0" encoding="utf-8"?>
+<p:tagLst xmlns:a="http://schemas.openxmlformats.org/drawingml/2006/main" xmlns:r="http://schemas.openxmlformats.org/officeDocument/2006/relationships" xmlns:p="http://schemas.openxmlformats.org/presentationml/2006/main">
+  <p:tag name="TIMING" val="|11.3|1.4|19.4|4.3|4.3"/>
+</p:tagLst>
+</file>
+
+<file path=ppt/tags/tag2.xml><?xml version="1.0" encoding="utf-8"?>
+<p:tagLst xmlns:a="http://schemas.openxmlformats.org/drawingml/2006/main" xmlns:r="http://schemas.openxmlformats.org/officeDocument/2006/relationships" xmlns:p="http://schemas.openxmlformats.org/presentationml/2006/main">
+  <p:tag name="TIMING" val="|11.3|4.6|4|6.7|22.1|8.2|6|2.7|8.2"/>
+</p:tagLst>
 </file>
 
 <file path=ppt/theme/theme1.xml><?xml version="1.0" encoding="utf-8"?>
@@ -15776,12 +18098,9 @@
 </file>
 
 <file path=customXml/item1.xml><?xml version="1.0" encoding="utf-8"?>
-<?mso-contentType ?>
-<FormTemplates xmlns="http://schemas.microsoft.com/sharepoint/v3/contenttype/forms">
-  <Display>DocumentLibraryForm</Display>
-  <Edit>DocumentLibraryForm</Edit>
-  <New>DocumentLibraryForm</New>
-</FormTemplates>
+<p:properties xmlns:p="http://schemas.microsoft.com/office/2006/metadata/properties" xmlns:xsi="http://www.w3.org/2001/XMLSchema-instance" xmlns:pc="http://schemas.microsoft.com/office/infopath/2007/PartnerControls">
+  <documentManagement/>
+</p:properties>
 </file>
 
 <file path=customXml/item2.xml><?xml version="1.0" encoding="utf-8"?>
@@ -15939,15 +18258,26 @@
 </file>
 
 <file path=customXml/item3.xml><?xml version="1.0" encoding="utf-8"?>
-<p:properties xmlns:p="http://schemas.microsoft.com/office/2006/metadata/properties" xmlns:xsi="http://www.w3.org/2001/XMLSchema-instance" xmlns:pc="http://schemas.microsoft.com/office/infopath/2007/PartnerControls">
-  <documentManagement/>
-</p:properties>
+<?mso-contentType ?>
+<FormTemplates xmlns="http://schemas.microsoft.com/sharepoint/v3/contenttype/forms">
+  <Display>DocumentLibraryForm</Display>
+  <Edit>DocumentLibraryForm</Edit>
+  <New>DocumentLibraryForm</New>
+</FormTemplates>
 </file>
 
 <file path=customXml/itemProps1.xml><?xml version="1.0" encoding="utf-8"?>
-<ds:datastoreItem xmlns:ds="http://schemas.openxmlformats.org/officeDocument/2006/customXml" ds:itemID="{758FDAC0-319D-4A54-8D8E-1D42CB1F8004}">
+<ds:datastoreItem xmlns:ds="http://schemas.openxmlformats.org/officeDocument/2006/customXml" ds:itemID="{F990F116-B58F-4255-B05B-DA3808E0E5C6}">
   <ds:schemaRefs>
-    <ds:schemaRef ds:uri="http://schemas.microsoft.com/sharepoint/v3/contenttype/forms"/>
+    <ds:schemaRef ds:uri="630a2e83-186a-4a0f-ab27-bee8a8096abc"/>
+    <ds:schemaRef ds:uri="http://schemas.microsoft.com/office/2006/documentManagement/types"/>
+    <ds:schemaRef ds:uri="http://schemas.microsoft.com/office/infopath/2007/PartnerControls"/>
+    <ds:schemaRef ds:uri="http://purl.org/dc/elements/1.1/"/>
+    <ds:schemaRef ds:uri="http://schemas.microsoft.com/office/2006/metadata/properties"/>
+    <ds:schemaRef ds:uri="http://purl.org/dc/terms/"/>
+    <ds:schemaRef ds:uri="http://schemas.openxmlformats.org/package/2006/metadata/core-properties"/>
+    <ds:schemaRef ds:uri="http://www.w3.org/XML/1998/namespace"/>
+    <ds:schemaRef ds:uri="http://purl.org/dc/dcmitype/"/>
   </ds:schemaRefs>
 </ds:datastoreItem>
 </file>
@@ -15971,17 +18301,9 @@
 </file>
 
 <file path=customXml/itemProps3.xml><?xml version="1.0" encoding="utf-8"?>
-<ds:datastoreItem xmlns:ds="http://schemas.openxmlformats.org/officeDocument/2006/customXml" ds:itemID="{F990F116-B58F-4255-B05B-DA3808E0E5C6}">
+<ds:datastoreItem xmlns:ds="http://schemas.openxmlformats.org/officeDocument/2006/customXml" ds:itemID="{758FDAC0-319D-4A54-8D8E-1D42CB1F8004}">
   <ds:schemaRefs>
-    <ds:schemaRef ds:uri="630a2e83-186a-4a0f-ab27-bee8a8096abc"/>
-    <ds:schemaRef ds:uri="http://schemas.microsoft.com/office/2006/documentManagement/types"/>
-    <ds:schemaRef ds:uri="http://schemas.microsoft.com/office/infopath/2007/PartnerControls"/>
-    <ds:schemaRef ds:uri="http://purl.org/dc/elements/1.1/"/>
-    <ds:schemaRef ds:uri="http://schemas.microsoft.com/office/2006/metadata/properties"/>
-    <ds:schemaRef ds:uri="http://purl.org/dc/terms/"/>
-    <ds:schemaRef ds:uri="http://schemas.openxmlformats.org/package/2006/metadata/core-properties"/>
-    <ds:schemaRef ds:uri="http://www.w3.org/XML/1998/namespace"/>
-    <ds:schemaRef ds:uri="http://purl.org/dc/dcmitype/"/>
+    <ds:schemaRef ds:uri="http://schemas.microsoft.com/sharepoint/v3/contenttype/forms"/>
   </ds:schemaRefs>
 </ds:datastoreItem>
 </file>
</xml_diff>

<commit_message>
Increased GH logo size #18
</commit_message>
<xml_diff>
--- a/Presentation/Module00-Hols.pptx
+++ b/Presentation/Module00-Hols.pptx
@@ -288,7 +288,7 @@
               <a:rPr lang="en-US" smtClean="0">
                 <a:latin typeface="Segoe UI" pitchFamily="34" charset="0"/>
               </a:rPr>
-              <a:t>10/19/2016 12:12 PM</a:t>
+              <a:t>11/14/2016 9:39 AM</a:t>
             </a:fld>
             <a:endParaRPr lang="en-US" dirty="0">
               <a:latin typeface="Segoe UI" pitchFamily="34" charset="0"/>
@@ -566,7 +566,7 @@
           <a:p>
             <a:fld id="{196BB360-4395-422C-A729-CB974B278917}" type="datetime8">
               <a:rPr lang="en-US" smtClean="0"/>
-              <a:t>10/19/2016 12:11 PM</a:t>
+              <a:t>11/14/2016 9:39 AM</a:t>
             </a:fld>
             <a:endParaRPr lang="en-US" dirty="0"/>
           </a:p>
@@ -895,7 +895,7 @@
           <a:p>
             <a:fld id="{B9E68977-C62F-48C1-B8E5-A952982F1FDC}" type="datetime8">
               <a:rPr lang="en-US" smtClean="0"/>
-              <a:t>10/19/2016 12:11 PM</a:t>
+              <a:t>11/14/2016 9:39 AM</a:t>
             </a:fld>
             <a:endParaRPr lang="en-US" dirty="0"/>
           </a:p>
@@ -1170,7 +1170,7 @@
           <a:p>
             <a:fld id="{196BB360-4395-422C-A729-CB974B278917}" type="datetime8">
               <a:rPr lang="en-US" smtClean="0"/>
-              <a:t>10/19/2016 12:11 PM</a:t>
+              <a:t>11/14/2016 9:39 AM</a:t>
             </a:fld>
             <a:endParaRPr lang="en-US" dirty="0"/>
           </a:p>
@@ -1351,7 +1351,7 @@
           <a:p>
             <a:fld id="{196BB360-4395-422C-A729-CB974B278917}" type="datetime8">
               <a:rPr lang="en-US" smtClean="0"/>
-              <a:t>10/19/2016 12:11 PM</a:t>
+              <a:t>11/14/2016 9:39 AM</a:t>
             </a:fld>
             <a:endParaRPr lang="en-US" dirty="0"/>
           </a:p>
@@ -1532,7 +1532,7 @@
           <a:p>
             <a:fld id="{196BB360-4395-422C-A729-CB974B278917}" type="datetime8">
               <a:rPr lang="en-US" smtClean="0"/>
-              <a:t>10/19/2016 12:11 PM</a:t>
+              <a:t>11/14/2016 9:39 AM</a:t>
             </a:fld>
             <a:endParaRPr lang="en-US" dirty="0"/>
           </a:p>
@@ -15075,36 +15075,54 @@
           <a:bodyPr/>
           <a:lstStyle/>
           <a:p>
+            <a:pPr marL="0" indent="0">
+              <a:buNone/>
+            </a:pPr>
             <a:r>
               <a:rPr lang="en-US" dirty="0"/>
               <a:t>HOL 1 - Tools and Developer Environment Setup</a:t>
             </a:r>
           </a:p>
           <a:p>
+            <a:pPr marL="0" indent="0">
+              <a:buNone/>
+            </a:pPr>
             <a:r>
               <a:rPr lang="en-US" dirty="0"/>
               <a:t>HOL 2 - Modern Cloud Apps</a:t>
             </a:r>
           </a:p>
           <a:p>
+            <a:pPr marL="0" indent="0">
+              <a:buNone/>
+            </a:pPr>
             <a:r>
               <a:rPr lang="en-US" dirty="0"/>
               <a:t>HOL 3 - Identity and Office365 APIs</a:t>
             </a:r>
           </a:p>
           <a:p>
+            <a:pPr marL="0" indent="0">
+              <a:buNone/>
+            </a:pPr>
             <a:r>
               <a:rPr lang="en-US" dirty="0"/>
               <a:t>HOL 4 - DevOps Continuous integration</a:t>
             </a:r>
           </a:p>
           <a:p>
+            <a:pPr marL="0" indent="0">
+              <a:buNone/>
+            </a:pPr>
             <a:r>
               <a:rPr lang="en-US" dirty="0"/>
               <a:t>HOL 5 - Infrastructure as code</a:t>
             </a:r>
           </a:p>
           <a:p>
+            <a:pPr marL="0" indent="0">
+              <a:buNone/>
+            </a:pPr>
             <a:r>
               <a:rPr lang="en-US" dirty="0"/>
               <a:t>HOL 6 - Monitoring</a:t>
@@ -15340,11 +15358,11 @@
   <p:clrMapOvr>
     <a:masterClrMapping/>
   </p:clrMapOvr>
-  <mc:AlternateContent xmlns:mc="http://schemas.openxmlformats.org/markup-compatibility/2006">
-    <mc:Choice xmlns:p14="http://schemas.microsoft.com/office/powerpoint/2010/main" Requires="p14">
+  <mc:AlternateContent xmlns:mc="http://schemas.openxmlformats.org/markup-compatibility/2006" xmlns:p14="http://schemas.microsoft.com/office/powerpoint/2010/main">
+    <mc:Choice Requires="p14">
       <p:transition p14:dur="0"/>
     </mc:Choice>
-    <mc:Fallback>
+    <mc:Fallback xmlns="">
       <p:transition/>
     </mc:Fallback>
   </mc:AlternateContent>
@@ -18054,9 +18072,9 @@
         <p:grpSpPr>
           <a:xfrm>
             <a:off x="2019250" y="1038499"/>
-            <a:ext cx="9747014" cy="2671264"/>
+            <a:ext cx="10294248" cy="3040935"/>
             <a:chOff x="2019250" y="1038499"/>
-            <a:chExt cx="9747014" cy="2671264"/>
+            <a:chExt cx="10294248" cy="3040935"/>
           </a:xfrm>
         </p:grpSpPr>
         <p:grpSp>
@@ -18068,9 +18086,9 @@
           <p:grpSpPr>
             <a:xfrm>
               <a:off x="7551912" y="1038499"/>
-              <a:ext cx="4214352" cy="2671264"/>
+              <a:ext cx="4761586" cy="3040935"/>
               <a:chOff x="7551912" y="1038499"/>
-              <a:chExt cx="4214352" cy="2671264"/>
+              <a:chExt cx="4761586" cy="3040935"/>
             </a:xfrm>
           </p:grpSpPr>
           <p:grpSp>
@@ -18082,9 +18100,9 @@
             <p:grpSpPr>
               <a:xfrm>
                 <a:off x="7551912" y="1038499"/>
-                <a:ext cx="4214352" cy="2671264"/>
+                <a:ext cx="4761586" cy="3040935"/>
                 <a:chOff x="7551912" y="1038499"/>
-                <a:chExt cx="4214352" cy="2671264"/>
+                <a:chExt cx="4761586" cy="3040935"/>
               </a:xfrm>
             </p:grpSpPr>
             <p:sp>
@@ -18182,8 +18200,8 @@
               </p:blipFill>
               <p:spPr>
                 <a:xfrm>
-                  <a:off x="9282991" y="3045630"/>
-                  <a:ext cx="752194" cy="664133"/>
+                  <a:off x="10995581" y="2915808"/>
+                  <a:ext cx="1317917" cy="1163626"/>
                 </a:xfrm>
                 <a:prstGeom prst="rect">
                   <a:avLst/>
@@ -19682,11 +19700,11 @@
   <p:clrMapOvr>
     <a:masterClrMapping/>
   </p:clrMapOvr>
-  <mc:AlternateContent xmlns:mc="http://schemas.openxmlformats.org/markup-compatibility/2006">
-    <mc:Choice xmlns:p14="http://schemas.microsoft.com/office/powerpoint/2010/main" Requires="p14">
+  <mc:AlternateContent xmlns:mc="http://schemas.openxmlformats.org/markup-compatibility/2006" xmlns:p14="http://schemas.microsoft.com/office/powerpoint/2010/main">
+    <mc:Choice Requires="p14">
       <p:transition p14:dur="10"/>
     </mc:Choice>
-    <mc:Fallback>
+    <mc:Fallback xmlns="">
       <p:transition/>
     </mc:Fallback>
   </mc:AlternateContent>
@@ -21592,9 +21610,12 @@
 </file>
 
 <file path=customXml/item1.xml><?xml version="1.0" encoding="utf-8"?>
-<p:properties xmlns:p="http://schemas.microsoft.com/office/2006/metadata/properties" xmlns:xsi="http://www.w3.org/2001/XMLSchema-instance" xmlns:pc="http://schemas.microsoft.com/office/infopath/2007/PartnerControls">
-  <documentManagement/>
-</p:properties>
+<?mso-contentType ?>
+<FormTemplates xmlns="http://schemas.microsoft.com/sharepoint/v3/contenttype/forms">
+  <Display>DocumentLibraryForm</Display>
+  <Edit>DocumentLibraryForm</Edit>
+  <New>DocumentLibraryForm</New>
+</FormTemplates>
 </file>
 
 <file path=customXml/item2.xml><?xml version="1.0" encoding="utf-8"?>
@@ -21752,26 +21773,15 @@
 </file>
 
 <file path=customXml/item3.xml><?xml version="1.0" encoding="utf-8"?>
-<?mso-contentType ?>
-<FormTemplates xmlns="http://schemas.microsoft.com/sharepoint/v3/contenttype/forms">
-  <Display>DocumentLibraryForm</Display>
-  <Edit>DocumentLibraryForm</Edit>
-  <New>DocumentLibraryForm</New>
-</FormTemplates>
+<p:properties xmlns:p="http://schemas.microsoft.com/office/2006/metadata/properties" xmlns:xsi="http://www.w3.org/2001/XMLSchema-instance" xmlns:pc="http://schemas.microsoft.com/office/infopath/2007/PartnerControls">
+  <documentManagement/>
+</p:properties>
 </file>
 
 <file path=customXml/itemProps1.xml><?xml version="1.0" encoding="utf-8"?>
-<ds:datastoreItem xmlns:ds="http://schemas.openxmlformats.org/officeDocument/2006/customXml" ds:itemID="{F990F116-B58F-4255-B05B-DA3808E0E5C6}">
+<ds:datastoreItem xmlns:ds="http://schemas.openxmlformats.org/officeDocument/2006/customXml" ds:itemID="{758FDAC0-319D-4A54-8D8E-1D42CB1F8004}">
   <ds:schemaRefs>
-    <ds:schemaRef ds:uri="http://schemas.openxmlformats.org/package/2006/metadata/core-properties"/>
-    <ds:schemaRef ds:uri="http://schemas.microsoft.com/office/2006/metadata/properties"/>
-    <ds:schemaRef ds:uri="630a2e83-186a-4a0f-ab27-bee8a8096abc"/>
-    <ds:schemaRef ds:uri="http://purl.org/dc/dcmitype/"/>
-    <ds:schemaRef ds:uri="http://www.w3.org/XML/1998/namespace"/>
-    <ds:schemaRef ds:uri="http://purl.org/dc/terms/"/>
-    <ds:schemaRef ds:uri="http://schemas.microsoft.com/office/2006/documentManagement/types"/>
-    <ds:schemaRef ds:uri="http://schemas.microsoft.com/office/infopath/2007/PartnerControls"/>
-    <ds:schemaRef ds:uri="http://purl.org/dc/elements/1.1/"/>
+    <ds:schemaRef ds:uri="http://schemas.microsoft.com/sharepoint/v3/contenttype/forms"/>
   </ds:schemaRefs>
 </ds:datastoreItem>
 </file>
@@ -21795,9 +21805,17 @@
 </file>
 
 <file path=customXml/itemProps3.xml><?xml version="1.0" encoding="utf-8"?>
-<ds:datastoreItem xmlns:ds="http://schemas.openxmlformats.org/officeDocument/2006/customXml" ds:itemID="{758FDAC0-319D-4A54-8D8E-1D42CB1F8004}">
+<ds:datastoreItem xmlns:ds="http://schemas.openxmlformats.org/officeDocument/2006/customXml" ds:itemID="{F990F116-B58F-4255-B05B-DA3808E0E5C6}">
   <ds:schemaRefs>
-    <ds:schemaRef ds:uri="http://schemas.microsoft.com/sharepoint/v3/contenttype/forms"/>
+    <ds:schemaRef ds:uri="http://schemas.openxmlformats.org/package/2006/metadata/core-properties"/>
+    <ds:schemaRef ds:uri="http://schemas.microsoft.com/office/2006/metadata/properties"/>
+    <ds:schemaRef ds:uri="630a2e83-186a-4a0f-ab27-bee8a8096abc"/>
+    <ds:schemaRef ds:uri="http://purl.org/dc/dcmitype/"/>
+    <ds:schemaRef ds:uri="http://www.w3.org/XML/1998/namespace"/>
+    <ds:schemaRef ds:uri="http://purl.org/dc/terms/"/>
+    <ds:schemaRef ds:uri="http://schemas.microsoft.com/office/2006/documentManagement/types"/>
+    <ds:schemaRef ds:uri="http://schemas.microsoft.com/office/infopath/2007/PartnerControls"/>
+    <ds:schemaRef ds:uri="http://purl.org/dc/elements/1.1/"/>
   </ds:schemaRefs>
 </ds:datastoreItem>
 </file>
</xml_diff>

<commit_message>
Add additional tips. Remove linux from deck
</commit_message>
<xml_diff>
--- a/Presentation/Module00-Hols.pptx
+++ b/Presentation/Module00-Hols.pptx
@@ -288,7 +288,7 @@
               <a:rPr lang="en-US" smtClean="0">
                 <a:latin typeface="Segoe UI" pitchFamily="34" charset="0"/>
               </a:rPr>
-              <a:t>11/14/2016 9:39 AM</a:t>
+              <a:t>12/6/2016 12:30 PM</a:t>
             </a:fld>
             <a:endParaRPr lang="en-US" dirty="0">
               <a:latin typeface="Segoe UI" pitchFamily="34" charset="0"/>
@@ -566,7 +566,7 @@
           <a:p>
             <a:fld id="{196BB360-4395-422C-A729-CB974B278917}" type="datetime8">
               <a:rPr lang="en-US" smtClean="0"/>
-              <a:t>11/14/2016 9:39 AM</a:t>
+              <a:t>12/6/2016 12:30 PM</a:t>
             </a:fld>
             <a:endParaRPr lang="en-US" dirty="0"/>
           </a:p>
@@ -895,7 +895,7 @@
           <a:p>
             <a:fld id="{B9E68977-C62F-48C1-B8E5-A952982F1FDC}" type="datetime8">
               <a:rPr lang="en-US" smtClean="0"/>
-              <a:t>11/14/2016 9:39 AM</a:t>
+              <a:t>12/6/2016 12:30 PM</a:t>
             </a:fld>
             <a:endParaRPr lang="en-US" dirty="0"/>
           </a:p>
@@ -1170,7 +1170,7 @@
           <a:p>
             <a:fld id="{196BB360-4395-422C-A729-CB974B278917}" type="datetime8">
               <a:rPr lang="en-US" smtClean="0"/>
-              <a:t>11/14/2016 9:39 AM</a:t>
+              <a:t>12/6/2016 12:30 PM</a:t>
             </a:fld>
             <a:endParaRPr lang="en-US" dirty="0"/>
           </a:p>
@@ -1351,7 +1351,7 @@
           <a:p>
             <a:fld id="{196BB360-4395-422C-A729-CB974B278917}" type="datetime8">
               <a:rPr lang="en-US" smtClean="0"/>
-              <a:t>11/14/2016 9:39 AM</a:t>
+              <a:t>12/6/2016 12:30 PM</a:t>
             </a:fld>
             <a:endParaRPr lang="en-US" dirty="0"/>
           </a:p>
@@ -1532,7 +1532,7 @@
           <a:p>
             <a:fld id="{196BB360-4395-422C-A729-CB974B278917}" type="datetime8">
               <a:rPr lang="en-US" smtClean="0"/>
-              <a:t>11/14/2016 9:39 AM</a:t>
+              <a:t>12/6/2016 12:30 PM</a:t>
             </a:fld>
             <a:endParaRPr lang="en-US" dirty="0"/>
           </a:p>
@@ -20176,7 +20176,7 @@
             <a:pPr lvl="1"/>
             <a:r>
               <a:rPr lang="en-US" dirty="0"/>
-              <a:t>Virtual Machines (Windows &amp; Linux)</a:t>
+              <a:t>Virtual Machines (Windows)</a:t>
             </a:r>
           </a:p>
           <a:p>
@@ -20278,7 +20278,7 @@
             <a:pPr lvl="1"/>
             <a:r>
               <a:rPr lang="en-US" dirty="0"/>
-              <a:t>Docker </a:t>
+              <a:t>Docker</a:t>
             </a:r>
           </a:p>
           <a:p>
@@ -20365,14 +20365,14 @@
           <a:p>
             <a:r>
               <a:rPr lang="en-US" dirty="0"/>
-              <a:t>Take prepared image, walk through the tools that are available for your platform</a:t>
+              <a:t>Take prepared image or run locally, walk through the tools that are available for your platform</a:t>
             </a:r>
           </a:p>
           <a:p>
             <a:pPr lvl="1"/>
             <a:r>
               <a:rPr lang="en-US" dirty="0"/>
-              <a:t>.NET, Node.JS, Java | Windows, Linux</a:t>
+              <a:t>.NET, Node.JS, Java | Windows. Mac OSX</a:t>
             </a:r>
           </a:p>
           <a:p>
@@ -21610,12 +21610,9 @@
 </file>
 
 <file path=customXml/item1.xml><?xml version="1.0" encoding="utf-8"?>
-<?mso-contentType ?>
-<FormTemplates xmlns="http://schemas.microsoft.com/sharepoint/v3/contenttype/forms">
-  <Display>DocumentLibraryForm</Display>
-  <Edit>DocumentLibraryForm</Edit>
-  <New>DocumentLibraryForm</New>
-</FormTemplates>
+<p:properties xmlns:p="http://schemas.microsoft.com/office/2006/metadata/properties" xmlns:xsi="http://www.w3.org/2001/XMLSchema-instance" xmlns:pc="http://schemas.microsoft.com/office/infopath/2007/PartnerControls">
+  <documentManagement/>
+</p:properties>
 </file>
 
 <file path=customXml/item2.xml><?xml version="1.0" encoding="utf-8"?>
@@ -21773,15 +21770,26 @@
 </file>
 
 <file path=customXml/item3.xml><?xml version="1.0" encoding="utf-8"?>
-<p:properties xmlns:p="http://schemas.microsoft.com/office/2006/metadata/properties" xmlns:xsi="http://www.w3.org/2001/XMLSchema-instance" xmlns:pc="http://schemas.microsoft.com/office/infopath/2007/PartnerControls">
-  <documentManagement/>
-</p:properties>
+<?mso-contentType ?>
+<FormTemplates xmlns="http://schemas.microsoft.com/sharepoint/v3/contenttype/forms">
+  <Display>DocumentLibraryForm</Display>
+  <Edit>DocumentLibraryForm</Edit>
+  <New>DocumentLibraryForm</New>
+</FormTemplates>
 </file>
 
 <file path=customXml/itemProps1.xml><?xml version="1.0" encoding="utf-8"?>
-<ds:datastoreItem xmlns:ds="http://schemas.openxmlformats.org/officeDocument/2006/customXml" ds:itemID="{758FDAC0-319D-4A54-8D8E-1D42CB1F8004}">
+<ds:datastoreItem xmlns:ds="http://schemas.openxmlformats.org/officeDocument/2006/customXml" ds:itemID="{F990F116-B58F-4255-B05B-DA3808E0E5C6}">
   <ds:schemaRefs>
-    <ds:schemaRef ds:uri="http://schemas.microsoft.com/sharepoint/v3/contenttype/forms"/>
+    <ds:schemaRef ds:uri="http://schemas.openxmlformats.org/package/2006/metadata/core-properties"/>
+    <ds:schemaRef ds:uri="http://schemas.microsoft.com/office/2006/metadata/properties"/>
+    <ds:schemaRef ds:uri="630a2e83-186a-4a0f-ab27-bee8a8096abc"/>
+    <ds:schemaRef ds:uri="http://purl.org/dc/dcmitype/"/>
+    <ds:schemaRef ds:uri="http://www.w3.org/XML/1998/namespace"/>
+    <ds:schemaRef ds:uri="http://purl.org/dc/terms/"/>
+    <ds:schemaRef ds:uri="http://schemas.microsoft.com/office/2006/documentManagement/types"/>
+    <ds:schemaRef ds:uri="http://schemas.microsoft.com/office/infopath/2007/PartnerControls"/>
+    <ds:schemaRef ds:uri="http://purl.org/dc/elements/1.1/"/>
   </ds:schemaRefs>
 </ds:datastoreItem>
 </file>
@@ -21805,17 +21813,9 @@
 </file>
 
 <file path=customXml/itemProps3.xml><?xml version="1.0" encoding="utf-8"?>
-<ds:datastoreItem xmlns:ds="http://schemas.openxmlformats.org/officeDocument/2006/customXml" ds:itemID="{F990F116-B58F-4255-B05B-DA3808E0E5C6}">
+<ds:datastoreItem xmlns:ds="http://schemas.openxmlformats.org/officeDocument/2006/customXml" ds:itemID="{758FDAC0-319D-4A54-8D8E-1D42CB1F8004}">
   <ds:schemaRefs>
-    <ds:schemaRef ds:uri="http://schemas.openxmlformats.org/package/2006/metadata/core-properties"/>
-    <ds:schemaRef ds:uri="http://schemas.microsoft.com/office/2006/metadata/properties"/>
-    <ds:schemaRef ds:uri="630a2e83-186a-4a0f-ab27-bee8a8096abc"/>
-    <ds:schemaRef ds:uri="http://purl.org/dc/dcmitype/"/>
-    <ds:schemaRef ds:uri="http://www.w3.org/XML/1998/namespace"/>
-    <ds:schemaRef ds:uri="http://purl.org/dc/terms/"/>
-    <ds:schemaRef ds:uri="http://schemas.microsoft.com/office/2006/documentManagement/types"/>
-    <ds:schemaRef ds:uri="http://schemas.microsoft.com/office/infopath/2007/PartnerControls"/>
-    <ds:schemaRef ds:uri="http://purl.org/dc/elements/1.1/"/>
+    <ds:schemaRef ds:uri="http://schemas.microsoft.com/sharepoint/v3/contenttype/forms"/>
   </ds:schemaRefs>
 </ds:datastoreItem>
 </file>
</xml_diff>